<commit_message>
feat(Redux): Update to pptx
</commit_message>
<xml_diff>
--- a/bootcamp/web/redux/presentation/redux.pptx
+++ b/bootcamp/web/redux/presentation/redux.pptx
@@ -5,7 +5,7 @@
     <p:sldMasterId id="2147483648" r:id="rId1"/>
   </p:sldMasterIdLst>
   <p:notesMasterIdLst>
-    <p:notesMasterId r:id="rId32"/>
+    <p:notesMasterId r:id="rId34"/>
   </p:notesMasterIdLst>
   <p:sldIdLst>
     <p:sldId id="256" r:id="rId2"/>
@@ -21,23 +21,25 @@
     <p:sldId id="275" r:id="rId12"/>
     <p:sldId id="297" r:id="rId13"/>
     <p:sldId id="301" r:id="rId14"/>
-    <p:sldId id="262" r:id="rId15"/>
-    <p:sldId id="268" r:id="rId16"/>
-    <p:sldId id="269" r:id="rId17"/>
-    <p:sldId id="270" r:id="rId18"/>
-    <p:sldId id="271" r:id="rId19"/>
-    <p:sldId id="281" r:id="rId20"/>
-    <p:sldId id="282" r:id="rId21"/>
-    <p:sldId id="272" r:id="rId22"/>
-    <p:sldId id="290" r:id="rId23"/>
-    <p:sldId id="298" r:id="rId24"/>
-    <p:sldId id="288" r:id="rId25"/>
-    <p:sldId id="295" r:id="rId26"/>
-    <p:sldId id="286" r:id="rId27"/>
-    <p:sldId id="285" r:id="rId28"/>
-    <p:sldId id="296" r:id="rId29"/>
-    <p:sldId id="263" r:id="rId30"/>
-    <p:sldId id="266" r:id="rId31"/>
+    <p:sldId id="302" r:id="rId15"/>
+    <p:sldId id="262" r:id="rId16"/>
+    <p:sldId id="268" r:id="rId17"/>
+    <p:sldId id="269" r:id="rId18"/>
+    <p:sldId id="270" r:id="rId19"/>
+    <p:sldId id="271" r:id="rId20"/>
+    <p:sldId id="281" r:id="rId21"/>
+    <p:sldId id="282" r:id="rId22"/>
+    <p:sldId id="272" r:id="rId23"/>
+    <p:sldId id="303" r:id="rId24"/>
+    <p:sldId id="290" r:id="rId25"/>
+    <p:sldId id="298" r:id="rId26"/>
+    <p:sldId id="288" r:id="rId27"/>
+    <p:sldId id="295" r:id="rId28"/>
+    <p:sldId id="286" r:id="rId29"/>
+    <p:sldId id="285" r:id="rId30"/>
+    <p:sldId id="296" r:id="rId31"/>
+    <p:sldId id="263" r:id="rId32"/>
+    <p:sldId id="266" r:id="rId33"/>
   </p:sldIdLst>
   <p:sldSz cx="12192000" cy="6858000"/>
   <p:notesSz cx="6858000" cy="9144000"/>
@@ -6412,7 +6414,7 @@
     </p:spTree>
     <p:extLst>
       <p:ext uri="{BB962C8B-B14F-4D97-AF65-F5344CB8AC3E}">
-        <p14:creationId xmlns:p14="http://schemas.microsoft.com/office/powerpoint/2010/main" val="1486688780"/>
+        <p14:creationId xmlns:p14="http://schemas.microsoft.com/office/powerpoint/2010/main" val="4109845958"/>
       </p:ext>
     </p:extLst>
   </p:cSld>
@@ -6466,10 +6468,7 @@
           <a:bodyPr/>
           <a:lstStyle/>
           <a:p>
-            <a:r>
-              <a:rPr lang="en-US" dirty="0"/>
-              <a:t>Is a simple object</a:t>
-            </a:r>
+            <a:endParaRPr lang="en-US" dirty="0"/>
           </a:p>
         </p:txBody>
       </p:sp>
@@ -6499,7 +6498,7 @@
     </p:spTree>
     <p:extLst>
       <p:ext uri="{BB962C8B-B14F-4D97-AF65-F5344CB8AC3E}">
-        <p14:creationId xmlns:p14="http://schemas.microsoft.com/office/powerpoint/2010/main" val="3127079880"/>
+        <p14:creationId xmlns:p14="http://schemas.microsoft.com/office/powerpoint/2010/main" val="1486688780"/>
       </p:ext>
     </p:extLst>
   </p:cSld>
@@ -6554,151 +6553,8 @@
           <a:lstStyle/>
           <a:p>
             <a:r>
-              <a:rPr lang="en-US" b="0" i="0" dirty="0">
-                <a:solidFill>
-                  <a:srgbClr val="1C1E21"/>
-                </a:solidFill>
-                <a:effectLst/>
-                <a:latin typeface="system-ui"/>
-              </a:rPr>
-              <a:t>An </a:t>
-            </a:r>
-            <a:r>
-              <a:rPr lang="en-US" b="1" i="0" dirty="0">
-                <a:solidFill>
-                  <a:srgbClr val="1C1E21"/>
-                </a:solidFill>
-                <a:effectLst/>
-                <a:latin typeface="system-ui"/>
-              </a:rPr>
-              <a:t>action</a:t>
-            </a:r>
-            <a:r>
-              <a:rPr lang="en-US" b="0" i="0" dirty="0">
-                <a:solidFill>
-                  <a:srgbClr val="1C1E21"/>
-                </a:solidFill>
-                <a:effectLst/>
-                <a:latin typeface="system-ui"/>
-              </a:rPr>
-              <a:t> is a plain JavaScript object that has a </a:t>
-            </a:r>
-            <a:r>
               <a:rPr lang="en-US" dirty="0"/>
-              <a:t>type</a:t>
-            </a:r>
-            <a:r>
-              <a:rPr lang="en-US" b="0" i="0" dirty="0">
-                <a:solidFill>
-                  <a:srgbClr val="1C1E21"/>
-                </a:solidFill>
-                <a:effectLst/>
-                <a:latin typeface="system-ui"/>
-              </a:rPr>
-              <a:t> field and optionally a payload. </a:t>
-            </a:r>
-            <a:br>
-              <a:rPr lang="en-US" b="0" i="0" dirty="0">
-                <a:solidFill>
-                  <a:srgbClr val="1C1E21"/>
-                </a:solidFill>
-                <a:effectLst/>
-                <a:latin typeface="system-ui"/>
-              </a:rPr>
-            </a:br>
-            <a:r>
-              <a:rPr lang="en-US" b="1" i="0" dirty="0">
-                <a:solidFill>
-                  <a:srgbClr val="1C1E21"/>
-                </a:solidFill>
-                <a:effectLst/>
-                <a:latin typeface="system-ui"/>
-              </a:rPr>
-              <a:t>An actions describes something that happened in the application</a:t>
-            </a:r>
-            <a:r>
-              <a:rPr lang="en-US" b="0" i="0" dirty="0">
-                <a:solidFill>
-                  <a:srgbClr val="1C1E21"/>
-                </a:solidFill>
-                <a:effectLst/>
-                <a:latin typeface="system-ui"/>
-              </a:rPr>
-              <a:t>.</a:t>
-            </a:r>
-          </a:p>
-          <a:p>
-            <a:r>
-              <a:rPr lang="en-US" b="0" i="0" dirty="0">
-                <a:solidFill>
-                  <a:srgbClr val="1C1E21"/>
-                </a:solidFill>
-                <a:effectLst/>
-                <a:latin typeface="system-ui"/>
-              </a:rPr>
-              <a:t>Normally type is written as “domain/</a:t>
-            </a:r>
-            <a:r>
-              <a:rPr lang="en-US" b="0" i="0" dirty="0" err="1">
-                <a:solidFill>
-                  <a:srgbClr val="1C1E21"/>
-                </a:solidFill>
-                <a:effectLst/>
-                <a:latin typeface="system-ui"/>
-              </a:rPr>
-              <a:t>eventName</a:t>
-            </a:r>
-            <a:r>
-              <a:rPr lang="en-US" b="0" i="0" dirty="0">
-                <a:solidFill>
-                  <a:srgbClr val="1C1E21"/>
-                </a:solidFill>
-                <a:effectLst/>
-                <a:latin typeface="system-ui"/>
-              </a:rPr>
-              <a:t>”, where domain points to the feature or category and </a:t>
-            </a:r>
-            <a:r>
-              <a:rPr lang="en-US" b="0" i="0" dirty="0" err="1">
-                <a:solidFill>
-                  <a:srgbClr val="1C1E21"/>
-                </a:solidFill>
-                <a:effectLst/>
-                <a:latin typeface="system-ui"/>
-              </a:rPr>
-              <a:t>eventName</a:t>
-            </a:r>
-            <a:r>
-              <a:rPr lang="en-US" b="0" i="0" dirty="0">
-                <a:solidFill>
-                  <a:srgbClr val="1C1E21"/>
-                </a:solidFill>
-                <a:effectLst/>
-                <a:latin typeface="system-ui"/>
-              </a:rPr>
-              <a:t> the events that happened. </a:t>
-            </a:r>
-          </a:p>
-          <a:p>
-            <a:endParaRPr lang="en-US" b="0" i="0" dirty="0">
-              <a:solidFill>
-                <a:srgbClr val="1C1E21"/>
-              </a:solidFill>
-              <a:effectLst/>
-              <a:latin typeface="system-ui"/>
-            </a:endParaRPr>
-          </a:p>
-          <a:p>
-            <a:r>
-              <a:rPr lang="en-US" dirty="0"/>
-              <a:t>On the image we see both an action and action creator. </a:t>
-            </a:r>
-            <a:br>
-              <a:rPr lang="en-US" dirty="0"/>
-            </a:br>
-            <a:r>
-              <a:rPr lang="en-US" dirty="0"/>
-              <a:t>Action creators makes sure that you do not have to write the type every time. </a:t>
+              <a:t>Is a simple object</a:t>
             </a:r>
           </a:p>
         </p:txBody>
@@ -6729,7 +6585,7 @@
     </p:spTree>
     <p:extLst>
       <p:ext uri="{BB962C8B-B14F-4D97-AF65-F5344CB8AC3E}">
-        <p14:creationId xmlns:p14="http://schemas.microsoft.com/office/powerpoint/2010/main" val="1065099690"/>
+        <p14:creationId xmlns:p14="http://schemas.microsoft.com/office/powerpoint/2010/main" val="3127079880"/>
       </p:ext>
     </p:extLst>
   </p:cSld>
@@ -6783,7 +6639,153 @@
           <a:bodyPr/>
           <a:lstStyle/>
           <a:p>
-            <a:endParaRPr lang="en-US" dirty="0"/>
+            <a:r>
+              <a:rPr lang="en-US" b="0" i="0" dirty="0">
+                <a:solidFill>
+                  <a:srgbClr val="1C1E21"/>
+                </a:solidFill>
+                <a:effectLst/>
+                <a:latin typeface="system-ui"/>
+              </a:rPr>
+              <a:t>An </a:t>
+            </a:r>
+            <a:r>
+              <a:rPr lang="en-US" b="1" i="0" dirty="0">
+                <a:solidFill>
+                  <a:srgbClr val="1C1E21"/>
+                </a:solidFill>
+                <a:effectLst/>
+                <a:latin typeface="system-ui"/>
+              </a:rPr>
+              <a:t>action</a:t>
+            </a:r>
+            <a:r>
+              <a:rPr lang="en-US" b="0" i="0" dirty="0">
+                <a:solidFill>
+                  <a:srgbClr val="1C1E21"/>
+                </a:solidFill>
+                <a:effectLst/>
+                <a:latin typeface="system-ui"/>
+              </a:rPr>
+              <a:t> is a plain JavaScript object that has a </a:t>
+            </a:r>
+            <a:r>
+              <a:rPr lang="en-US" dirty="0"/>
+              <a:t>type</a:t>
+            </a:r>
+            <a:r>
+              <a:rPr lang="en-US" b="0" i="0" dirty="0">
+                <a:solidFill>
+                  <a:srgbClr val="1C1E21"/>
+                </a:solidFill>
+                <a:effectLst/>
+                <a:latin typeface="system-ui"/>
+              </a:rPr>
+              <a:t> field and optionally a payload. </a:t>
+            </a:r>
+            <a:br>
+              <a:rPr lang="en-US" b="0" i="0" dirty="0">
+                <a:solidFill>
+                  <a:srgbClr val="1C1E21"/>
+                </a:solidFill>
+                <a:effectLst/>
+                <a:latin typeface="system-ui"/>
+              </a:rPr>
+            </a:br>
+            <a:r>
+              <a:rPr lang="en-US" b="1" i="0" dirty="0">
+                <a:solidFill>
+                  <a:srgbClr val="1C1E21"/>
+                </a:solidFill>
+                <a:effectLst/>
+                <a:latin typeface="system-ui"/>
+              </a:rPr>
+              <a:t>An actions describes something that happened in the application</a:t>
+            </a:r>
+            <a:r>
+              <a:rPr lang="en-US" b="0" i="0" dirty="0">
+                <a:solidFill>
+                  <a:srgbClr val="1C1E21"/>
+                </a:solidFill>
+                <a:effectLst/>
+                <a:latin typeface="system-ui"/>
+              </a:rPr>
+              <a:t>.</a:t>
+            </a:r>
+          </a:p>
+          <a:p>
+            <a:r>
+              <a:rPr lang="en-US" b="0" i="0" dirty="0">
+                <a:solidFill>
+                  <a:srgbClr val="1C1E21"/>
+                </a:solidFill>
+                <a:effectLst/>
+                <a:latin typeface="system-ui"/>
+              </a:rPr>
+              <a:t>Normally type is written as “domain/</a:t>
+            </a:r>
+            <a:r>
+              <a:rPr lang="en-US" b="0" i="0" dirty="0" err="1">
+                <a:solidFill>
+                  <a:srgbClr val="1C1E21"/>
+                </a:solidFill>
+                <a:effectLst/>
+                <a:latin typeface="system-ui"/>
+              </a:rPr>
+              <a:t>eventName</a:t>
+            </a:r>
+            <a:r>
+              <a:rPr lang="en-US" b="0" i="0" dirty="0">
+                <a:solidFill>
+                  <a:srgbClr val="1C1E21"/>
+                </a:solidFill>
+                <a:effectLst/>
+                <a:latin typeface="system-ui"/>
+              </a:rPr>
+              <a:t>”, where domain points to the feature or category and </a:t>
+            </a:r>
+            <a:r>
+              <a:rPr lang="en-US" b="0" i="0" dirty="0" err="1">
+                <a:solidFill>
+                  <a:srgbClr val="1C1E21"/>
+                </a:solidFill>
+                <a:effectLst/>
+                <a:latin typeface="system-ui"/>
+              </a:rPr>
+              <a:t>eventName</a:t>
+            </a:r>
+            <a:r>
+              <a:rPr lang="en-US" b="0" i="0" dirty="0">
+                <a:solidFill>
+                  <a:srgbClr val="1C1E21"/>
+                </a:solidFill>
+                <a:effectLst/>
+                <a:latin typeface="system-ui"/>
+              </a:rPr>
+              <a:t> the events that happened. </a:t>
+            </a:r>
+          </a:p>
+          <a:p>
+            <a:endParaRPr lang="en-US" b="0" i="0" dirty="0">
+              <a:solidFill>
+                <a:srgbClr val="1C1E21"/>
+              </a:solidFill>
+              <a:effectLst/>
+              <a:latin typeface="system-ui"/>
+            </a:endParaRPr>
+          </a:p>
+          <a:p>
+            <a:r>
+              <a:rPr lang="en-US" dirty="0"/>
+              <a:t>On the image we see both an action and action creator. </a:t>
+            </a:r>
+            <a:br>
+              <a:rPr lang="en-US" dirty="0"/>
+            </a:br>
+            <a:r>
+              <a:rPr lang="en-US" dirty="0"/>
+              <a:t>Action creators makes sure that you do not have to write the type every time. </a:t>
+            </a:r>
           </a:p>
         </p:txBody>
       </p:sp>
@@ -6813,7 +6815,7 @@
     </p:spTree>
     <p:extLst>
       <p:ext uri="{BB962C8B-B14F-4D97-AF65-F5344CB8AC3E}">
-        <p14:creationId xmlns:p14="http://schemas.microsoft.com/office/powerpoint/2010/main" val="3723905872"/>
+        <p14:creationId xmlns:p14="http://schemas.microsoft.com/office/powerpoint/2010/main" val="1065099690"/>
       </p:ext>
     </p:extLst>
   </p:cSld>
@@ -6867,275 +6869,6 @@
           <a:bodyPr/>
           <a:lstStyle/>
           <a:p>
-            <a:pPr algn="l"/>
-            <a:r>
-              <a:rPr lang="en-US" b="0" i="0" dirty="0">
-                <a:solidFill>
-                  <a:srgbClr val="1C1E21"/>
-                </a:solidFill>
-                <a:effectLst/>
-                <a:latin typeface="system-ui"/>
-              </a:rPr>
-              <a:t>A </a:t>
-            </a:r>
-            <a:r>
-              <a:rPr lang="en-US" b="1" i="0" dirty="0">
-                <a:solidFill>
-                  <a:srgbClr val="1C1E21"/>
-                </a:solidFill>
-                <a:effectLst/>
-                <a:latin typeface="system-ui"/>
-              </a:rPr>
-              <a:t>reducer</a:t>
-            </a:r>
-            <a:r>
-              <a:rPr lang="en-US" b="0" i="0" dirty="0">
-                <a:solidFill>
-                  <a:srgbClr val="1C1E21"/>
-                </a:solidFill>
-                <a:effectLst/>
-                <a:latin typeface="system-ui"/>
-              </a:rPr>
-              <a:t> is a function that receives the current </a:t>
-            </a:r>
-            <a:r>
-              <a:rPr lang="en-US" dirty="0"/>
-              <a:t>state</a:t>
-            </a:r>
-            <a:r>
-              <a:rPr lang="en-US" b="0" i="0" dirty="0">
-                <a:solidFill>
-                  <a:srgbClr val="1C1E21"/>
-                </a:solidFill>
-                <a:effectLst/>
-                <a:latin typeface="system-ui"/>
-              </a:rPr>
-              <a:t> and an </a:t>
-            </a:r>
-            <a:r>
-              <a:rPr lang="en-US" dirty="0"/>
-              <a:t>action</a:t>
-            </a:r>
-            <a:r>
-              <a:rPr lang="en-US" b="0" i="0" dirty="0">
-                <a:solidFill>
-                  <a:srgbClr val="1C1E21"/>
-                </a:solidFill>
-                <a:effectLst/>
-                <a:latin typeface="system-ui"/>
-              </a:rPr>
-              <a:t> object, decides how to update the state if necessary, and returns the new state: </a:t>
-            </a:r>
-            <a:r>
-              <a:rPr lang="en-US" dirty="0"/>
-              <a:t>(state, action) =&gt; </a:t>
-            </a:r>
-            <a:r>
-              <a:rPr lang="en-US" dirty="0" err="1"/>
-              <a:t>newState</a:t>
-            </a:r>
-            <a:r>
-              <a:rPr lang="en-US" b="0" i="0" dirty="0">
-                <a:solidFill>
-                  <a:srgbClr val="1C1E21"/>
-                </a:solidFill>
-                <a:effectLst/>
-                <a:latin typeface="system-ui"/>
-              </a:rPr>
-              <a:t>. </a:t>
-            </a:r>
-            <a:r>
-              <a:rPr lang="en-US" b="1" i="0" dirty="0">
-                <a:solidFill>
-                  <a:srgbClr val="1C1E21"/>
-                </a:solidFill>
-                <a:effectLst/>
-                <a:latin typeface="system-ui"/>
-              </a:rPr>
-              <a:t>You can think of a reducer as an event listener which handles events based on the received action (event) type.</a:t>
-            </a:r>
-            <a:br>
-              <a:rPr lang="en-US" b="0" i="0" dirty="0">
-                <a:solidFill>
-                  <a:srgbClr val="1C1E21"/>
-                </a:solidFill>
-                <a:effectLst/>
-                <a:latin typeface="system-ui"/>
-              </a:rPr>
-            </a:br>
-            <a:br>
-              <a:rPr lang="en-US" b="0" i="0" dirty="0">
-                <a:solidFill>
-                  <a:srgbClr val="1C1E21"/>
-                </a:solidFill>
-                <a:effectLst/>
-                <a:latin typeface="system-ui"/>
-              </a:rPr>
-            </a:br>
-            <a:r>
-              <a:rPr lang="en-US" b="0" i="0" dirty="0">
-                <a:solidFill>
-                  <a:srgbClr val="1C1E21"/>
-                </a:solidFill>
-                <a:effectLst/>
-                <a:latin typeface="system-ui"/>
-              </a:rPr>
-              <a:t>Reducers must </a:t>
-            </a:r>
-            <a:r>
-              <a:rPr lang="en-US" b="0" i="1" dirty="0">
-                <a:solidFill>
-                  <a:srgbClr val="1C1E21"/>
-                </a:solidFill>
-                <a:effectLst/>
-                <a:latin typeface="system-ui"/>
-              </a:rPr>
-              <a:t>always</a:t>
-            </a:r>
-            <a:r>
-              <a:rPr lang="en-US" b="0" i="0" dirty="0">
-                <a:solidFill>
-                  <a:srgbClr val="1C1E21"/>
-                </a:solidFill>
-                <a:effectLst/>
-                <a:latin typeface="system-ui"/>
-              </a:rPr>
-              <a:t> follow some specific rules:</a:t>
-            </a:r>
-          </a:p>
-          <a:p>
-            <a:pPr marL="171450" lvl="0" indent="-171450" algn="l">
-              <a:buFont typeface="Arial" panose="020B0604020202020204" pitchFamily="34" charset="0"/>
-              <a:buChar char="•"/>
-            </a:pPr>
-            <a:r>
-              <a:rPr lang="en-US" b="0" i="0" dirty="0">
-                <a:solidFill>
-                  <a:srgbClr val="1C1E21"/>
-                </a:solidFill>
-                <a:effectLst/>
-                <a:latin typeface="system-ui"/>
-              </a:rPr>
-              <a:t>They should only calculate the new state value based on the state and action arguments</a:t>
-            </a:r>
-          </a:p>
-          <a:p>
-            <a:pPr marL="171450" lvl="0" indent="-171450" algn="l">
-              <a:buFont typeface="Arial" panose="020B0604020202020204" pitchFamily="34" charset="0"/>
-              <a:buChar char="•"/>
-            </a:pPr>
-            <a:r>
-              <a:rPr lang="en-US" b="0" i="0" dirty="0">
-                <a:solidFill>
-                  <a:srgbClr val="1C1E21"/>
-                </a:solidFill>
-                <a:effectLst/>
-                <a:latin typeface="system-ui"/>
-              </a:rPr>
-              <a:t>They must make </a:t>
-            </a:r>
-            <a:r>
-              <a:rPr lang="en-US" b="1" i="1" dirty="0">
-                <a:solidFill>
-                  <a:srgbClr val="1C1E21"/>
-                </a:solidFill>
-                <a:effectLst/>
-                <a:latin typeface="system-ui"/>
-              </a:rPr>
-              <a:t>immutable updates</a:t>
-            </a:r>
-            <a:r>
-              <a:rPr lang="en-US" b="0" i="0" dirty="0">
-                <a:solidFill>
-                  <a:srgbClr val="1C1E21"/>
-                </a:solidFill>
-                <a:effectLst/>
-                <a:latin typeface="system-ui"/>
-              </a:rPr>
-              <a:t>, due to shallow equality checking. </a:t>
-            </a:r>
-          </a:p>
-          <a:p>
-            <a:pPr marL="171450" lvl="0" indent="-171450" algn="l">
-              <a:buFont typeface="Arial" panose="020B0604020202020204" pitchFamily="34" charset="0"/>
-              <a:buChar char="•"/>
-            </a:pPr>
-            <a:r>
-              <a:rPr lang="en-US" b="0" i="0" dirty="0">
-                <a:solidFill>
-                  <a:srgbClr val="1C1E21"/>
-                </a:solidFill>
-                <a:effectLst/>
-                <a:latin typeface="system-ui"/>
-              </a:rPr>
-              <a:t>They must not do any asynchronous logic, calculate random values, or cause other "side effects"</a:t>
-            </a:r>
-          </a:p>
-          <a:p>
-            <a:pPr algn="l"/>
-            <a:br>
-              <a:rPr lang="en-US" dirty="0"/>
-            </a:br>
-            <a:r>
-              <a:rPr lang="en-US" b="0" i="0" dirty="0">
-                <a:solidFill>
-                  <a:srgbClr val="1C1E21"/>
-                </a:solidFill>
-                <a:effectLst/>
-                <a:latin typeface="system-ui"/>
-              </a:rPr>
-              <a:t>The logic inside reducer functions typically follows the same series of steps:</a:t>
-            </a:r>
-          </a:p>
-          <a:p>
-            <a:pPr marL="171450" indent="-171450" algn="l">
-              <a:buFont typeface="Arial" panose="020B0604020202020204" pitchFamily="34" charset="0"/>
-              <a:buChar char="•"/>
-            </a:pPr>
-            <a:r>
-              <a:rPr lang="en-US" b="0" i="0" dirty="0">
-                <a:solidFill>
-                  <a:srgbClr val="1C1E21"/>
-                </a:solidFill>
-                <a:effectLst/>
-                <a:latin typeface="system-ui"/>
-              </a:rPr>
-              <a:t>Check to see if the reducer cares about this action</a:t>
-            </a:r>
-          </a:p>
-          <a:p>
-            <a:pPr marL="628650" lvl="1" indent="-171450" algn="l">
-              <a:buFont typeface="Arial" panose="020B0604020202020204" pitchFamily="34" charset="0"/>
-              <a:buChar char="•"/>
-            </a:pPr>
-            <a:r>
-              <a:rPr lang="en-US" b="0" i="0" dirty="0">
-                <a:solidFill>
-                  <a:srgbClr val="1C1E21"/>
-                </a:solidFill>
-                <a:effectLst/>
-                <a:latin typeface="system-ui"/>
-              </a:rPr>
-              <a:t>If so, make a copy of the state, update the copy with new values, and return it</a:t>
-            </a:r>
-          </a:p>
-          <a:p>
-            <a:pPr marL="171450" indent="-171450" algn="l">
-              <a:buFont typeface="Arial" panose="020B0604020202020204" pitchFamily="34" charset="0"/>
-              <a:buChar char="•"/>
-            </a:pPr>
-            <a:r>
-              <a:rPr lang="en-US" b="0" i="0" dirty="0">
-                <a:solidFill>
-                  <a:srgbClr val="1C1E21"/>
-                </a:solidFill>
-                <a:effectLst/>
-                <a:latin typeface="system-ui"/>
-              </a:rPr>
-              <a:t>Otherwise, return the existing state unchanged</a:t>
-            </a:r>
-          </a:p>
-          <a:p>
             <a:endParaRPr lang="en-US" dirty="0"/>
           </a:p>
         </p:txBody>
@@ -7166,7 +6899,7 @@
     </p:spTree>
     <p:extLst>
       <p:ext uri="{BB962C8B-B14F-4D97-AF65-F5344CB8AC3E}">
-        <p14:creationId xmlns:p14="http://schemas.microsoft.com/office/powerpoint/2010/main" val="3110140389"/>
+        <p14:creationId xmlns:p14="http://schemas.microsoft.com/office/powerpoint/2010/main" val="3723905872"/>
       </p:ext>
     </p:extLst>
   </p:cSld>
@@ -7220,10 +6953,7 @@
           <a:bodyPr/>
           <a:lstStyle/>
           <a:p>
-            <a:pPr marL="171450" indent="-171450" algn="l">
-              <a:buFont typeface="Arial" panose="020B0604020202020204" pitchFamily="34" charset="0"/>
-              <a:buChar char="•"/>
-            </a:pPr>
+            <a:pPr algn="l"/>
             <a:r>
               <a:rPr lang="en-US" b="0" i="0" dirty="0">
                 <a:solidFill>
@@ -7232,14 +6962,18 @@
                 <a:effectLst/>
                 <a:latin typeface="system-ui"/>
               </a:rPr>
-              <a:t>Something happens in the app, such as a user clicking a button</a:t>
-            </a:r>
-          </a:p>
-          <a:p>
-            <a:pPr marL="171450" indent="-171450" algn="l">
-              <a:buFont typeface="Arial" panose="020B0604020202020204" pitchFamily="34" charset="0"/>
-              <a:buChar char="•"/>
-            </a:pPr>
+              <a:t>A </a:t>
+            </a:r>
+            <a:r>
+              <a:rPr lang="en-US" b="1" i="0" dirty="0">
+                <a:solidFill>
+                  <a:srgbClr val="1C1E21"/>
+                </a:solidFill>
+                <a:effectLst/>
+                <a:latin typeface="system-ui"/>
+              </a:rPr>
+              <a:t>reducer</a:t>
+            </a:r>
             <a:r>
               <a:rPr lang="en-US" b="0" i="0" dirty="0">
                 <a:solidFill>
@@ -7248,14 +6982,12 @@
                 <a:effectLst/>
                 <a:latin typeface="system-ui"/>
               </a:rPr>
-              <a:t>The app code dispatches an action to the Redux store, like dispatch({type: 'counter/increment'})</a:t>
-            </a:r>
-          </a:p>
-          <a:p>
-            <a:pPr marL="171450" indent="-171450" algn="l">
-              <a:buFont typeface="Arial" panose="020B0604020202020204" pitchFamily="34" charset="0"/>
-              <a:buChar char="•"/>
-            </a:pPr>
+              <a:t> is a function that receives the current </a:t>
+            </a:r>
+            <a:r>
+              <a:rPr lang="en-US" dirty="0"/>
+              <a:t>state</a:t>
+            </a:r>
             <a:r>
               <a:rPr lang="en-US" b="0" i="0" dirty="0">
                 <a:solidFill>
@@ -7264,14 +6996,12 @@
                 <a:effectLst/>
                 <a:latin typeface="system-ui"/>
               </a:rPr>
-              <a:t>The store runs the reducer function again with the previous state and the current action, and saves the return value as the new state</a:t>
-            </a:r>
-          </a:p>
-          <a:p>
-            <a:pPr marL="171450" indent="-171450" algn="l">
-              <a:buFont typeface="Arial" panose="020B0604020202020204" pitchFamily="34" charset="0"/>
-              <a:buChar char="•"/>
-            </a:pPr>
+              <a:t> and an </a:t>
+            </a:r>
+            <a:r>
+              <a:rPr lang="en-US" dirty="0"/>
+              <a:t>action</a:t>
+            </a:r>
             <a:r>
               <a:rPr lang="en-US" b="0" i="0" dirty="0">
                 <a:solidFill>
@@ -7280,14 +7010,16 @@
                 <a:effectLst/>
                 <a:latin typeface="system-ui"/>
               </a:rPr>
-              <a:t>The store notifies all parts of the UI that are subscribed that the store has been updated</a:t>
-            </a:r>
-          </a:p>
-          <a:p>
-            <a:pPr marL="171450" indent="-171450" algn="l">
-              <a:buFont typeface="Arial" panose="020B0604020202020204" pitchFamily="34" charset="0"/>
-              <a:buChar char="•"/>
-            </a:pPr>
+              <a:t> object, decides how to update the state if necessary, and returns the new state: </a:t>
+            </a:r>
+            <a:r>
+              <a:rPr lang="en-US" dirty="0"/>
+              <a:t>(state, action) =&gt; </a:t>
+            </a:r>
+            <a:r>
+              <a:rPr lang="en-US" dirty="0" err="1"/>
+              <a:t>newState</a:t>
+            </a:r>
             <a:r>
               <a:rPr lang="en-US" b="0" i="0" dirty="0">
                 <a:solidFill>
@@ -7296,23 +7028,17 @@
                 <a:effectLst/>
                 <a:latin typeface="system-ui"/>
               </a:rPr>
-              <a:t>Each UI component that needs data from the store checks to see if the parts of the state they need have changed.</a:t>
-            </a:r>
-          </a:p>
-          <a:p>
-            <a:pPr marL="171450" indent="-171450" algn="l">
-              <a:buFont typeface="Arial" panose="020B0604020202020204" pitchFamily="34" charset="0"/>
-              <a:buChar char="•"/>
-            </a:pPr>
-            <a:r>
-              <a:rPr lang="en-US" b="0" i="0" dirty="0">
+              <a:t>. </a:t>
+            </a:r>
+            <a:r>
+              <a:rPr lang="en-US" b="1" i="0" dirty="0">
                 <a:solidFill>
                   <a:srgbClr val="1C1E21"/>
                 </a:solidFill>
                 <a:effectLst/>
                 <a:latin typeface="system-ui"/>
               </a:rPr>
-              <a:t>Each component that sees its data has changed forces a re-render with the new data, so it can update what's shown on the screen</a:t>
+              <a:t>You can think of a reducer as an event listener which handles events based on the received action (event) type.</a:t>
             </a:r>
             <a:br>
               <a:rPr lang="en-US" b="0" i="0" dirty="0">
@@ -7323,13 +7049,177 @@
                 <a:latin typeface="system-ui"/>
               </a:rPr>
             </a:br>
-            <a:endParaRPr lang="en-US" b="0" i="0" dirty="0">
-              <a:solidFill>
-                <a:srgbClr val="1C1E21"/>
-              </a:solidFill>
-              <a:effectLst/>
-              <a:latin typeface="system-ui"/>
-            </a:endParaRPr>
+            <a:br>
+              <a:rPr lang="en-US" b="0" i="0" dirty="0">
+                <a:solidFill>
+                  <a:srgbClr val="1C1E21"/>
+                </a:solidFill>
+                <a:effectLst/>
+                <a:latin typeface="system-ui"/>
+              </a:rPr>
+            </a:br>
+            <a:r>
+              <a:rPr lang="en-US" b="0" i="0" dirty="0">
+                <a:solidFill>
+                  <a:srgbClr val="1C1E21"/>
+                </a:solidFill>
+                <a:effectLst/>
+                <a:latin typeface="system-ui"/>
+              </a:rPr>
+              <a:t>Reducers must </a:t>
+            </a:r>
+            <a:r>
+              <a:rPr lang="en-US" b="0" i="1" dirty="0">
+                <a:solidFill>
+                  <a:srgbClr val="1C1E21"/>
+                </a:solidFill>
+                <a:effectLst/>
+                <a:latin typeface="system-ui"/>
+              </a:rPr>
+              <a:t>always</a:t>
+            </a:r>
+            <a:r>
+              <a:rPr lang="en-US" b="0" i="0" dirty="0">
+                <a:solidFill>
+                  <a:srgbClr val="1C1E21"/>
+                </a:solidFill>
+                <a:effectLst/>
+                <a:latin typeface="system-ui"/>
+              </a:rPr>
+              <a:t> follow some specific rules:</a:t>
+            </a:r>
+          </a:p>
+          <a:p>
+            <a:pPr marL="171450" lvl="0" indent="-171450" algn="l">
+              <a:buFont typeface="Arial" panose="020B0604020202020204" pitchFamily="34" charset="0"/>
+              <a:buChar char="•"/>
+            </a:pPr>
+            <a:r>
+              <a:rPr lang="en-US" b="0" i="0" dirty="0">
+                <a:solidFill>
+                  <a:srgbClr val="1C1E21"/>
+                </a:solidFill>
+                <a:effectLst/>
+                <a:latin typeface="system-ui"/>
+              </a:rPr>
+              <a:t>They should only calculate the new state value based on the state and action arguments</a:t>
+            </a:r>
+          </a:p>
+          <a:p>
+            <a:pPr marL="171450" lvl="0" indent="-171450" algn="l">
+              <a:buFont typeface="Arial" panose="020B0604020202020204" pitchFamily="34" charset="0"/>
+              <a:buChar char="•"/>
+            </a:pPr>
+            <a:r>
+              <a:rPr lang="en-US" b="0" i="0" dirty="0">
+                <a:solidFill>
+                  <a:srgbClr val="1C1E21"/>
+                </a:solidFill>
+                <a:effectLst/>
+                <a:latin typeface="system-ui"/>
+              </a:rPr>
+              <a:t>They must make </a:t>
+            </a:r>
+            <a:r>
+              <a:rPr lang="en-US" b="1" i="1" dirty="0">
+                <a:solidFill>
+                  <a:srgbClr val="1C1E21"/>
+                </a:solidFill>
+                <a:effectLst/>
+                <a:latin typeface="system-ui"/>
+              </a:rPr>
+              <a:t>immutable updates</a:t>
+            </a:r>
+            <a:r>
+              <a:rPr lang="en-US" b="0" i="0" dirty="0">
+                <a:solidFill>
+                  <a:srgbClr val="1C1E21"/>
+                </a:solidFill>
+                <a:effectLst/>
+                <a:latin typeface="system-ui"/>
+              </a:rPr>
+              <a:t>, due to shallow equality checking. </a:t>
+            </a:r>
+          </a:p>
+          <a:p>
+            <a:pPr marL="171450" lvl="0" indent="-171450" algn="l">
+              <a:buFont typeface="Arial" panose="020B0604020202020204" pitchFamily="34" charset="0"/>
+              <a:buChar char="•"/>
+            </a:pPr>
+            <a:r>
+              <a:rPr lang="en-US" b="0" i="0" dirty="0">
+                <a:solidFill>
+                  <a:srgbClr val="1C1E21"/>
+                </a:solidFill>
+                <a:effectLst/>
+                <a:latin typeface="system-ui"/>
+              </a:rPr>
+              <a:t>They must not do any asynchronous logic, calculate random values, or cause other "side effects"</a:t>
+            </a:r>
+          </a:p>
+          <a:p>
+            <a:pPr algn="l"/>
+            <a:br>
+              <a:rPr lang="en-US" dirty="0"/>
+            </a:br>
+            <a:r>
+              <a:rPr lang="en-US" b="0" i="0" dirty="0">
+                <a:solidFill>
+                  <a:srgbClr val="1C1E21"/>
+                </a:solidFill>
+                <a:effectLst/>
+                <a:latin typeface="system-ui"/>
+              </a:rPr>
+              <a:t>The logic inside reducer functions typically follows the same series of steps:</a:t>
+            </a:r>
+          </a:p>
+          <a:p>
+            <a:pPr marL="171450" indent="-171450" algn="l">
+              <a:buFont typeface="Arial" panose="020B0604020202020204" pitchFamily="34" charset="0"/>
+              <a:buChar char="•"/>
+            </a:pPr>
+            <a:r>
+              <a:rPr lang="en-US" b="0" i="0" dirty="0">
+                <a:solidFill>
+                  <a:srgbClr val="1C1E21"/>
+                </a:solidFill>
+                <a:effectLst/>
+                <a:latin typeface="system-ui"/>
+              </a:rPr>
+              <a:t>Check to see if the reducer cares about this action</a:t>
+            </a:r>
+          </a:p>
+          <a:p>
+            <a:pPr marL="628650" lvl="1" indent="-171450" algn="l">
+              <a:buFont typeface="Arial" panose="020B0604020202020204" pitchFamily="34" charset="0"/>
+              <a:buChar char="•"/>
+            </a:pPr>
+            <a:r>
+              <a:rPr lang="en-US" b="0" i="0" dirty="0">
+                <a:solidFill>
+                  <a:srgbClr val="1C1E21"/>
+                </a:solidFill>
+                <a:effectLst/>
+                <a:latin typeface="system-ui"/>
+              </a:rPr>
+              <a:t>If so, make a copy of the state, update the copy with new values, and return it</a:t>
+            </a:r>
+          </a:p>
+          <a:p>
+            <a:pPr marL="171450" indent="-171450" algn="l">
+              <a:buFont typeface="Arial" panose="020B0604020202020204" pitchFamily="34" charset="0"/>
+              <a:buChar char="•"/>
+            </a:pPr>
+            <a:r>
+              <a:rPr lang="en-US" b="0" i="0" dirty="0">
+                <a:solidFill>
+                  <a:srgbClr val="1C1E21"/>
+                </a:solidFill>
+                <a:effectLst/>
+                <a:latin typeface="system-ui"/>
+              </a:rPr>
+              <a:t>Otherwise, return the existing state unchanged</a:t>
+            </a:r>
           </a:p>
           <a:p>
             <a:endParaRPr lang="en-US" dirty="0"/>
@@ -7362,7 +7252,7 @@
     </p:spTree>
     <p:extLst>
       <p:ext uri="{BB962C8B-B14F-4D97-AF65-F5344CB8AC3E}">
-        <p14:creationId xmlns:p14="http://schemas.microsoft.com/office/powerpoint/2010/main" val="4222338410"/>
+        <p14:creationId xmlns:p14="http://schemas.microsoft.com/office/powerpoint/2010/main" val="3110140389"/>
       </p:ext>
     </p:extLst>
   </p:cSld>
@@ -7513,43 +7403,119 @@
           <a:bodyPr/>
           <a:lstStyle/>
           <a:p>
-            <a:r>
-              <a:rPr lang="en-US" dirty="0"/>
-              <a:t>The state part of components is now moved out of the component itself. </a:t>
-            </a:r>
-          </a:p>
-          <a:p>
-            <a:r>
-              <a:rPr lang="en-US" dirty="0"/>
-              <a:t>The logic behind updating state on action is also moved outside the component. </a:t>
+            <a:pPr marL="171450" indent="-171450" algn="l">
+              <a:buFont typeface="Arial" panose="020B0604020202020204" pitchFamily="34" charset="0"/>
+              <a:buChar char="•"/>
+            </a:pPr>
+            <a:r>
+              <a:rPr lang="en-US" b="0" i="0" dirty="0">
+                <a:solidFill>
+                  <a:srgbClr val="1C1E21"/>
+                </a:solidFill>
+                <a:effectLst/>
+                <a:latin typeface="system-ui"/>
+              </a:rPr>
+              <a:t>Something happens in the app, such as a user clicking a button</a:t>
+            </a:r>
+          </a:p>
+          <a:p>
+            <a:pPr marL="171450" indent="-171450" algn="l">
+              <a:buFont typeface="Arial" panose="020B0604020202020204" pitchFamily="34" charset="0"/>
+              <a:buChar char="•"/>
+            </a:pPr>
+            <a:r>
+              <a:rPr lang="en-US" b="0" i="0" dirty="0">
+                <a:solidFill>
+                  <a:srgbClr val="1C1E21"/>
+                </a:solidFill>
+                <a:effectLst/>
+                <a:latin typeface="system-ui"/>
+              </a:rPr>
+              <a:t>The app code dispatches an action to the Redux store, like dispatch({type: 'counter/increment'})</a:t>
+            </a:r>
+          </a:p>
+          <a:p>
+            <a:pPr marL="171450" indent="-171450" algn="l">
+              <a:buFont typeface="Arial" panose="020B0604020202020204" pitchFamily="34" charset="0"/>
+              <a:buChar char="•"/>
+            </a:pPr>
+            <a:r>
+              <a:rPr lang="en-US" b="0" i="0" dirty="0">
+                <a:solidFill>
+                  <a:srgbClr val="1C1E21"/>
+                </a:solidFill>
+                <a:effectLst/>
+                <a:latin typeface="system-ui"/>
+              </a:rPr>
+              <a:t>The store runs the reducer function again with the previous state and the current action, and saves the return value as the new state</a:t>
+            </a:r>
+          </a:p>
+          <a:p>
+            <a:pPr marL="171450" indent="-171450" algn="l">
+              <a:buFont typeface="Arial" panose="020B0604020202020204" pitchFamily="34" charset="0"/>
+              <a:buChar char="•"/>
+            </a:pPr>
+            <a:r>
+              <a:rPr lang="en-US" b="0" i="0" dirty="0">
+                <a:solidFill>
+                  <a:srgbClr val="1C1E21"/>
+                </a:solidFill>
+                <a:effectLst/>
+                <a:latin typeface="system-ui"/>
+              </a:rPr>
+              <a:t>The store notifies all parts of the UI that are subscribed that the store has been updated</a:t>
+            </a:r>
+          </a:p>
+          <a:p>
+            <a:pPr marL="171450" indent="-171450" algn="l">
+              <a:buFont typeface="Arial" panose="020B0604020202020204" pitchFamily="34" charset="0"/>
+              <a:buChar char="•"/>
+            </a:pPr>
+            <a:r>
+              <a:rPr lang="en-US" b="0" i="0" dirty="0">
+                <a:solidFill>
+                  <a:srgbClr val="1C1E21"/>
+                </a:solidFill>
+                <a:effectLst/>
+                <a:latin typeface="system-ui"/>
+              </a:rPr>
+              <a:t>Each UI component that needs data from the store checks to see if the parts of the state they need have changed.</a:t>
+            </a:r>
+          </a:p>
+          <a:p>
+            <a:pPr marL="171450" indent="-171450" algn="l">
+              <a:buFont typeface="Arial" panose="020B0604020202020204" pitchFamily="34" charset="0"/>
+              <a:buChar char="•"/>
+            </a:pPr>
+            <a:r>
+              <a:rPr lang="en-US" b="0" i="0" dirty="0">
+                <a:solidFill>
+                  <a:srgbClr val="1C1E21"/>
+                </a:solidFill>
+                <a:effectLst/>
+                <a:latin typeface="system-ui"/>
+              </a:rPr>
+              <a:t>Each component that sees its data has changed forces a re-render with the new data, so it can update what's shown on the screen</a:t>
             </a:r>
             <a:br>
-              <a:rPr lang="en-US" dirty="0"/>
+              <a:rPr lang="en-US" b="0" i="0" dirty="0">
+                <a:solidFill>
+                  <a:srgbClr val="1C1E21"/>
+                </a:solidFill>
+                <a:effectLst/>
+                <a:latin typeface="system-ui"/>
+              </a:rPr>
             </a:br>
-            <a:r>
-              <a:rPr lang="en-US" dirty="0"/>
-              <a:t>This means that there is </a:t>
-            </a:r>
-            <a:r>
-              <a:rPr lang="en-US" b="1" dirty="0"/>
-              <a:t>one consist </a:t>
-            </a:r>
-            <a:r>
-              <a:rPr lang="en-US" dirty="0"/>
-              <a:t>way of update the state of that variable</a:t>
-            </a:r>
-          </a:p>
-          <a:p>
-            <a:r>
-              <a:rPr lang="en-US" dirty="0"/>
-              <a:t>Moving it outside allows for more components to access the exact same data</a:t>
-            </a:r>
-          </a:p>
-          <a:p>
-            <a:r>
-              <a:rPr lang="en-US" dirty="0"/>
-              <a:t>Removes the updates issue that we saw initially. </a:t>
-            </a:r>
+            <a:endParaRPr lang="en-US" b="0" i="0" dirty="0">
+              <a:solidFill>
+                <a:srgbClr val="1C1E21"/>
+              </a:solidFill>
+              <a:effectLst/>
+              <a:latin typeface="system-ui"/>
+            </a:endParaRPr>
+          </a:p>
+          <a:p>
+            <a:endParaRPr lang="en-US" dirty="0"/>
           </a:p>
         </p:txBody>
       </p:sp>
@@ -7579,7 +7545,7 @@
     </p:spTree>
     <p:extLst>
       <p:ext uri="{BB962C8B-B14F-4D97-AF65-F5344CB8AC3E}">
-        <p14:creationId xmlns:p14="http://schemas.microsoft.com/office/powerpoint/2010/main" val="3460839863"/>
+        <p14:creationId xmlns:p14="http://schemas.microsoft.com/office/powerpoint/2010/main" val="4222338410"/>
       </p:ext>
     </p:extLst>
   </p:cSld>
@@ -7635,50 +7601,41 @@
           <a:p>
             <a:r>
               <a:rPr lang="en-US" dirty="0"/>
-              <a:t>Each component can use </a:t>
-            </a:r>
-            <a:r>
-              <a:rPr lang="en-US" dirty="0" err="1"/>
-              <a:t>useSelector</a:t>
-            </a:r>
+              <a:t>The state part of components is now moved out of the component itself. </a:t>
+            </a:r>
+          </a:p>
+          <a:p>
             <a:r>
               <a:rPr lang="en-US" dirty="0"/>
-              <a:t> to subscribe to values.</a:t>
-            </a:r>
-          </a:p>
-          <a:p>
-            <a:r>
-              <a:rPr lang="en-US" dirty="0"/>
-              <a:t>Each component can use </a:t>
-            </a:r>
-            <a:r>
-              <a:rPr lang="en-US" dirty="0" err="1"/>
-              <a:t>useDispatch</a:t>
-            </a:r>
-            <a:r>
-              <a:rPr lang="en-US" dirty="0"/>
-              <a:t> to dispatch actions. </a:t>
+              <a:t>The logic behind updating state on action is also moved outside the component. </a:t>
             </a:r>
             <a:br>
               <a:rPr lang="en-US" dirty="0"/>
             </a:br>
-            <a:br>
+            <a:r>
               <a:rPr lang="en-US" dirty="0"/>
-            </a:br>
-            <a:r>
-              <a:rPr lang="en-US" b="0" i="0" dirty="0">
-                <a:solidFill>
-                  <a:srgbClr val="000000"/>
-                </a:solidFill>
-                <a:effectLst/>
-                <a:latin typeface="-apple-system"/>
-              </a:rPr>
-              <a:t>Hooks are functions that let you “hook into” React state and lifecycle features from function components. </a:t>
-            </a:r>
-            <a:br>
+              <a:t>This means that there is </a:t>
+            </a:r>
+            <a:r>
+              <a:rPr lang="en-US" b="1" dirty="0"/>
+              <a:t>one consist </a:t>
+            </a:r>
+            <a:r>
               <a:rPr lang="en-US" dirty="0"/>
-            </a:br>
-            <a:endParaRPr lang="en-US" dirty="0"/>
+              <a:t>way of update the state of that variable</a:t>
+            </a:r>
+          </a:p>
+          <a:p>
+            <a:r>
+              <a:rPr lang="en-US" dirty="0"/>
+              <a:t>Moving it outside allows for more components to access the exact same data</a:t>
+            </a:r>
+          </a:p>
+          <a:p>
+            <a:r>
+              <a:rPr lang="en-US" dirty="0"/>
+              <a:t>Removes the updates issue that we saw initially. </a:t>
+            </a:r>
           </a:p>
         </p:txBody>
       </p:sp>
@@ -7708,7 +7665,7 @@
     </p:spTree>
     <p:extLst>
       <p:ext uri="{BB962C8B-B14F-4D97-AF65-F5344CB8AC3E}">
-        <p14:creationId xmlns:p14="http://schemas.microsoft.com/office/powerpoint/2010/main" val="1469072301"/>
+        <p14:creationId xmlns:p14="http://schemas.microsoft.com/office/powerpoint/2010/main" val="3460839863"/>
       </p:ext>
     </p:extLst>
   </p:cSld>
@@ -7764,7 +7721,29 @@
           <a:p>
             <a:r>
               <a:rPr lang="en-US" dirty="0"/>
-              <a:t>Any questions?</a:t>
+              <a:t>Each component can use </a:t>
+            </a:r>
+            <a:r>
+              <a:rPr lang="en-US" dirty="0" err="1"/>
+              <a:t>useSelector</a:t>
+            </a:r>
+            <a:r>
+              <a:rPr lang="en-US" dirty="0"/>
+              <a:t> to subscribe to values.</a:t>
+            </a:r>
+          </a:p>
+          <a:p>
+            <a:r>
+              <a:rPr lang="en-US" dirty="0"/>
+              <a:t>Each component can use </a:t>
+            </a:r>
+            <a:r>
+              <a:rPr lang="en-US" dirty="0" err="1"/>
+              <a:t>useDispatch</a:t>
+            </a:r>
+            <a:r>
+              <a:rPr lang="en-US" dirty="0"/>
+              <a:t> to dispatch actions. </a:t>
             </a:r>
             <a:br>
               <a:rPr lang="en-US" dirty="0"/>
@@ -7773,42 +7752,18 @@
               <a:rPr lang="en-US" dirty="0"/>
             </a:br>
             <a:r>
-              <a:rPr lang="en-US" dirty="0"/>
-              <a:t>We have seen that Redux moved state to store, reducing the need for property passing. </a:t>
-            </a:r>
-          </a:p>
-          <a:p>
-            <a:r>
-              <a:rPr lang="en-US" dirty="0"/>
-              <a:t>It also made sure that all updates to a variable is at one place. </a:t>
-            </a:r>
-          </a:p>
-          <a:p>
-            <a:r>
-              <a:rPr lang="en-US" dirty="0"/>
-              <a:t>And all updates happens the same way. </a:t>
+              <a:rPr lang="en-US" b="0" i="0" dirty="0">
+                <a:solidFill>
+                  <a:srgbClr val="000000"/>
+                </a:solidFill>
+                <a:effectLst/>
+                <a:latin typeface="-apple-system"/>
+              </a:rPr>
+              <a:t>Hooks are functions that let you “hook into” React state and lifecycle features from function components. </a:t>
             </a:r>
             <a:br>
               <a:rPr lang="en-US" dirty="0"/>
             </a:br>
-            <a:r>
-              <a:rPr lang="en-US" dirty="0"/>
-              <a:t>It is not possible for another component somewhere in the code base to update the variable in another way than what is done in the reducer. </a:t>
-            </a:r>
-          </a:p>
-          <a:p>
-            <a:endParaRPr lang="en-US" dirty="0"/>
-          </a:p>
-          <a:p>
-            <a:r>
-              <a:rPr lang="en-US" dirty="0"/>
-              <a:t>We must practice immutability due to shallow equality checking (only checks that reference in memory is equal)</a:t>
-            </a:r>
-          </a:p>
-          <a:p>
-            <a:endParaRPr lang="en-US" dirty="0"/>
-          </a:p>
-          <a:p>
             <a:endParaRPr lang="en-US" dirty="0"/>
           </a:p>
         </p:txBody>
@@ -7839,7 +7794,7 @@
     </p:spTree>
     <p:extLst>
       <p:ext uri="{BB962C8B-B14F-4D97-AF65-F5344CB8AC3E}">
-        <p14:creationId xmlns:p14="http://schemas.microsoft.com/office/powerpoint/2010/main" val="89220681"/>
+        <p14:creationId xmlns:p14="http://schemas.microsoft.com/office/powerpoint/2010/main" val="1469072301"/>
       </p:ext>
     </p:extLst>
   </p:cSld>
@@ -7893,6 +7848,14 @@
           <a:bodyPr/>
           <a:lstStyle/>
           <a:p>
+            <a:r>
+              <a:rPr lang="en-US" dirty="0"/>
+              <a:t>Reference types </a:t>
+            </a:r>
+            <a:r>
+              <a:rPr lang="en-US"/>
+              <a:t>vs value types</a:t>
+            </a:r>
             <a:endParaRPr lang="en-US" dirty="0"/>
           </a:p>
         </p:txBody>
@@ -7923,7 +7886,7 @@
     </p:spTree>
     <p:extLst>
       <p:ext uri="{BB962C8B-B14F-4D97-AF65-F5344CB8AC3E}">
-        <p14:creationId xmlns:p14="http://schemas.microsoft.com/office/powerpoint/2010/main" val="1441574351"/>
+        <p14:creationId xmlns:p14="http://schemas.microsoft.com/office/powerpoint/2010/main" val="4292252925"/>
       </p:ext>
     </p:extLst>
   </p:cSld>
@@ -7977,91 +7940,9 @@
           <a:bodyPr/>
           <a:lstStyle/>
           <a:p>
-            <a:pPr marL="0" marR="0" lvl="0" indent="0" algn="l" defTabSz="914400" rtl="0" eaLnBrk="1" fontAlgn="auto" latinLnBrk="0" hangingPunct="1">
-              <a:lnSpc>
-                <a:spcPct val="100000"/>
-              </a:lnSpc>
-              <a:spcBef>
-                <a:spcPts val="0"/>
-              </a:spcBef>
-              <a:spcAft>
-                <a:spcPts val="0"/>
-              </a:spcAft>
-              <a:buClrTx/>
-              <a:buSzTx/>
-              <a:buFontTx/>
-              <a:buNone/>
-              <a:tabLst/>
-              <a:defRPr/>
-            </a:pPr>
-            <a:r>
-              <a:rPr lang="en-US" b="0" i="0" dirty="0">
-                <a:solidFill>
-                  <a:srgbClr val="1C1E21"/>
-                </a:solidFill>
-                <a:effectLst/>
-                <a:latin typeface="system-ui"/>
-              </a:rPr>
-              <a:t>We always have to call </a:t>
-            </a:r>
-            <a:r>
-              <a:rPr lang="en-US" dirty="0" err="1"/>
-              <a:t>ReactDOM.render</a:t>
-            </a:r>
             <a:r>
               <a:rPr lang="en-US" dirty="0"/>
-              <a:t>(&lt;App /&gt;)</a:t>
-            </a:r>
-            <a:r>
-              <a:rPr lang="en-US" b="0" i="0" dirty="0">
-                <a:solidFill>
-                  <a:srgbClr val="1C1E21"/>
-                </a:solidFill>
-                <a:effectLst/>
-                <a:latin typeface="system-ui"/>
-              </a:rPr>
-              <a:t> to tell React to start rendering our root </a:t>
-            </a:r>
-            <a:r>
-              <a:rPr lang="en-US" dirty="0"/>
-              <a:t>&lt;App&gt;</a:t>
-            </a:r>
-            <a:r>
-              <a:rPr lang="en-US" b="0" i="0" dirty="0">
-                <a:solidFill>
-                  <a:srgbClr val="1C1E21"/>
-                </a:solidFill>
-                <a:effectLst/>
-                <a:latin typeface="system-ui"/>
-              </a:rPr>
-              <a:t> component. </a:t>
-            </a:r>
-          </a:p>
-          <a:p>
-            <a:pPr marL="0" marR="0" lvl="0" indent="0" algn="l" defTabSz="914400" rtl="0" eaLnBrk="1" fontAlgn="auto" latinLnBrk="0" hangingPunct="1">
-              <a:lnSpc>
-                <a:spcPct val="100000"/>
-              </a:lnSpc>
-              <a:spcBef>
-                <a:spcPts val="0"/>
-              </a:spcBef>
-              <a:spcAft>
-                <a:spcPts val="0"/>
-              </a:spcAft>
-              <a:buClrTx/>
-              <a:buSzTx/>
-              <a:buFontTx/>
-              <a:buNone/>
-              <a:tabLst/>
-              <a:defRPr/>
-            </a:pPr>
-            <a:r>
-              <a:rPr lang="en-US" dirty="0" err="1"/>
-              <a:t>useSelector</a:t>
-            </a:r>
-            <a:r>
-              <a:rPr lang="en-US" dirty="0"/>
-              <a:t> and dispatch they need access to store object.</a:t>
+              <a:t>Any questions?</a:t>
             </a:r>
             <a:br>
               <a:rPr lang="en-US" dirty="0"/>
@@ -8071,27 +7952,38 @@
             </a:br>
             <a:r>
               <a:rPr lang="en-US" dirty="0"/>
-              <a:t>We wrap the App in Provider and inject the store we want to use. This makes sure that the store is accessible from every component in the app that is within the Provider.  </a:t>
+              <a:t>We have seen that Redux moved state to store, reducing the need for property passing. </a:t>
+            </a:r>
+          </a:p>
+          <a:p>
+            <a:r>
+              <a:rPr lang="en-US" dirty="0"/>
+              <a:t>It also made sure that all updates to a variable is at one place. </a:t>
+            </a:r>
+          </a:p>
+          <a:p>
+            <a:r>
+              <a:rPr lang="en-US" dirty="0"/>
+              <a:t>And all updates happens the same way. </a:t>
             </a:r>
             <a:br>
               <a:rPr lang="en-US" dirty="0"/>
             </a:br>
-            <a:br>
+            <a:r>
               <a:rPr lang="en-US" dirty="0"/>
-            </a:br>
+              <a:t>It is not possible for another component somewhere in the code base to update the variable in another way than what is done in the reducer. </a:t>
+            </a:r>
+          </a:p>
+          <a:p>
+            <a:endParaRPr lang="en-US" dirty="0"/>
+          </a:p>
+          <a:p>
             <a:r>
               <a:rPr lang="en-US" dirty="0"/>
-              <a:t>Store.js shows how we create the store. The are other options, but we see that we register the reducers that we want. </a:t>
-            </a:r>
-            <a:br>
-              <a:rPr lang="en-US" b="0" i="0" dirty="0">
-                <a:solidFill>
-                  <a:srgbClr val="1C1E21"/>
-                </a:solidFill>
-                <a:effectLst/>
-                <a:latin typeface="system-ui"/>
-              </a:rPr>
-            </a:br>
+              <a:t>We must practice immutability due to shallow equality checking (only checks that reference in memory is equal)</a:t>
+            </a:r>
+          </a:p>
+          <a:p>
             <a:endParaRPr lang="en-US" dirty="0"/>
           </a:p>
           <a:p>
@@ -8125,7 +8017,7 @@
     </p:spTree>
     <p:extLst>
       <p:ext uri="{BB962C8B-B14F-4D97-AF65-F5344CB8AC3E}">
-        <p14:creationId xmlns:p14="http://schemas.microsoft.com/office/powerpoint/2010/main" val="2530753063"/>
+        <p14:creationId xmlns:p14="http://schemas.microsoft.com/office/powerpoint/2010/main" val="89220681"/>
       </p:ext>
     </p:extLst>
   </p:cSld>
@@ -8179,121 +8071,6 @@
           <a:bodyPr/>
           <a:lstStyle/>
           <a:p>
-            <a:pPr marL="0" marR="0" lvl="0" indent="0" algn="l" defTabSz="914400" rtl="0" eaLnBrk="1" fontAlgn="auto" latinLnBrk="0" hangingPunct="1">
-              <a:lnSpc>
-                <a:spcPct val="100000"/>
-              </a:lnSpc>
-              <a:spcBef>
-                <a:spcPts val="0"/>
-              </a:spcBef>
-              <a:spcAft>
-                <a:spcPts val="0"/>
-              </a:spcAft>
-              <a:buClrTx/>
-              <a:buSzTx/>
-              <a:buFontTx/>
-              <a:buNone/>
-              <a:tabLst/>
-              <a:defRPr/>
-            </a:pPr>
-            <a:r>
-              <a:rPr lang="en-US" b="0" i="0" dirty="0">
-                <a:solidFill>
-                  <a:srgbClr val="1C1E21"/>
-                </a:solidFill>
-                <a:effectLst/>
-                <a:latin typeface="system-ui"/>
-              </a:rPr>
-              <a:t>Setup of Redux requires creation of actions, action creators, constants and reducers. </a:t>
-            </a:r>
-            <a:br>
-              <a:rPr lang="en-US" b="0" i="0" dirty="0">
-                <a:solidFill>
-                  <a:srgbClr val="1C1E21"/>
-                </a:solidFill>
-                <a:effectLst/>
-                <a:latin typeface="system-ui"/>
-              </a:rPr>
-            </a:br>
-            <a:br>
-              <a:rPr lang="en-US" b="0" i="0" dirty="0">
-                <a:solidFill>
-                  <a:srgbClr val="1C1E21"/>
-                </a:solidFill>
-                <a:effectLst/>
-                <a:latin typeface="system-ui"/>
-              </a:rPr>
-            </a:br>
-            <a:r>
-              <a:rPr lang="en-US" b="0" i="0" dirty="0">
-                <a:solidFill>
-                  <a:srgbClr val="1C1E21"/>
-                </a:solidFill>
-                <a:effectLst/>
-                <a:latin typeface="system-ui"/>
-              </a:rPr>
-              <a:t>One of the critics of redux was the amount of code needed to be written for setup, boilerplate code. </a:t>
-            </a:r>
-            <a:br>
-              <a:rPr lang="en-US" b="0" i="0" dirty="0">
-                <a:solidFill>
-                  <a:srgbClr val="1C1E21"/>
-                </a:solidFill>
-                <a:effectLst/>
-                <a:latin typeface="system-ui"/>
-              </a:rPr>
-            </a:br>
-            <a:br>
-              <a:rPr lang="en-US" b="0" i="0" dirty="0">
-                <a:solidFill>
-                  <a:srgbClr val="1C1E21"/>
-                </a:solidFill>
-                <a:effectLst/>
-                <a:latin typeface="system-ui"/>
-              </a:rPr>
-            </a:br>
-            <a:r>
-              <a:rPr lang="en-US" b="0" i="0" dirty="0">
-                <a:solidFill>
-                  <a:srgbClr val="1C1E21"/>
-                </a:solidFill>
-                <a:effectLst/>
-                <a:latin typeface="system-ui"/>
-              </a:rPr>
-              <a:t>Redux released </a:t>
-            </a:r>
-            <a:r>
-              <a:rPr lang="en-US" b="0" i="0" dirty="0" err="1">
-                <a:solidFill>
-                  <a:srgbClr val="1C1E21"/>
-                </a:solidFill>
-                <a:effectLst/>
-                <a:latin typeface="system-ui"/>
-              </a:rPr>
-              <a:t>reduxjs</a:t>
-            </a:r>
-            <a:r>
-              <a:rPr lang="en-US" b="0" i="0" dirty="0">
-                <a:solidFill>
-                  <a:srgbClr val="1C1E21"/>
-                </a:solidFill>
-                <a:effectLst/>
-                <a:latin typeface="system-ui"/>
-              </a:rPr>
-              <a:t>/toolkit to reduce the amount of code needed to be written. </a:t>
-            </a:r>
-            <a:br>
-              <a:rPr lang="en-US" b="0" i="0" dirty="0">
-                <a:solidFill>
-                  <a:srgbClr val="1C1E21"/>
-                </a:solidFill>
-                <a:effectLst/>
-                <a:latin typeface="system-ui"/>
-              </a:rPr>
-            </a:br>
-            <a:endParaRPr lang="en-US" dirty="0"/>
-          </a:p>
-          <a:p>
             <a:endParaRPr lang="en-US" dirty="0"/>
           </a:p>
         </p:txBody>
@@ -8324,7 +8101,7 @@
     </p:spTree>
     <p:extLst>
       <p:ext uri="{BB962C8B-B14F-4D97-AF65-F5344CB8AC3E}">
-        <p14:creationId xmlns:p14="http://schemas.microsoft.com/office/powerpoint/2010/main" val="1667897536"/>
+        <p14:creationId xmlns:p14="http://schemas.microsoft.com/office/powerpoint/2010/main" val="1441574351"/>
       </p:ext>
     </p:extLst>
   </p:cSld>
@@ -8378,6 +8155,124 @@
           <a:bodyPr/>
           <a:lstStyle/>
           <a:p>
+            <a:pPr marL="0" marR="0" lvl="0" indent="0" algn="l" defTabSz="914400" rtl="0" eaLnBrk="1" fontAlgn="auto" latinLnBrk="0" hangingPunct="1">
+              <a:lnSpc>
+                <a:spcPct val="100000"/>
+              </a:lnSpc>
+              <a:spcBef>
+                <a:spcPts val="0"/>
+              </a:spcBef>
+              <a:spcAft>
+                <a:spcPts val="0"/>
+              </a:spcAft>
+              <a:buClrTx/>
+              <a:buSzTx/>
+              <a:buFontTx/>
+              <a:buNone/>
+              <a:tabLst/>
+              <a:defRPr/>
+            </a:pPr>
+            <a:r>
+              <a:rPr lang="en-US" b="0" i="0" dirty="0">
+                <a:solidFill>
+                  <a:srgbClr val="1C1E21"/>
+                </a:solidFill>
+                <a:effectLst/>
+                <a:latin typeface="system-ui"/>
+              </a:rPr>
+              <a:t>We always have to call </a:t>
+            </a:r>
+            <a:r>
+              <a:rPr lang="en-US" dirty="0" err="1"/>
+              <a:t>ReactDOM.render</a:t>
+            </a:r>
+            <a:r>
+              <a:rPr lang="en-US" dirty="0"/>
+              <a:t>(&lt;App /&gt;)</a:t>
+            </a:r>
+            <a:r>
+              <a:rPr lang="en-US" b="0" i="0" dirty="0">
+                <a:solidFill>
+                  <a:srgbClr val="1C1E21"/>
+                </a:solidFill>
+                <a:effectLst/>
+                <a:latin typeface="system-ui"/>
+              </a:rPr>
+              <a:t> to tell React to start rendering our root </a:t>
+            </a:r>
+            <a:r>
+              <a:rPr lang="en-US" dirty="0"/>
+              <a:t>&lt;App&gt;</a:t>
+            </a:r>
+            <a:r>
+              <a:rPr lang="en-US" b="0" i="0" dirty="0">
+                <a:solidFill>
+                  <a:srgbClr val="1C1E21"/>
+                </a:solidFill>
+                <a:effectLst/>
+                <a:latin typeface="system-ui"/>
+              </a:rPr>
+              <a:t> component. </a:t>
+            </a:r>
+          </a:p>
+          <a:p>
+            <a:pPr marL="0" marR="0" lvl="0" indent="0" algn="l" defTabSz="914400" rtl="0" eaLnBrk="1" fontAlgn="auto" latinLnBrk="0" hangingPunct="1">
+              <a:lnSpc>
+                <a:spcPct val="100000"/>
+              </a:lnSpc>
+              <a:spcBef>
+                <a:spcPts val="0"/>
+              </a:spcBef>
+              <a:spcAft>
+                <a:spcPts val="0"/>
+              </a:spcAft>
+              <a:buClrTx/>
+              <a:buSzTx/>
+              <a:buFontTx/>
+              <a:buNone/>
+              <a:tabLst/>
+              <a:defRPr/>
+            </a:pPr>
+            <a:r>
+              <a:rPr lang="en-US" dirty="0" err="1"/>
+              <a:t>useSelector</a:t>
+            </a:r>
+            <a:r>
+              <a:rPr lang="en-US" dirty="0"/>
+              <a:t> and dispatch they need access to store object.</a:t>
+            </a:r>
+            <a:br>
+              <a:rPr lang="en-US" dirty="0"/>
+            </a:br>
+            <a:br>
+              <a:rPr lang="en-US" dirty="0"/>
+            </a:br>
+            <a:r>
+              <a:rPr lang="en-US" dirty="0"/>
+              <a:t>We wrap the App in Provider and inject the store we want to use. This makes sure that the store is accessible from every component in the app that is within the Provider.  </a:t>
+            </a:r>
+            <a:br>
+              <a:rPr lang="en-US" dirty="0"/>
+            </a:br>
+            <a:br>
+              <a:rPr lang="en-US" dirty="0"/>
+            </a:br>
+            <a:r>
+              <a:rPr lang="en-US" dirty="0"/>
+              <a:t>Store.js shows how we create the store. The are other options, but we see that we register the reducers that we want. </a:t>
+            </a:r>
+            <a:br>
+              <a:rPr lang="en-US" b="0" i="0" dirty="0">
+                <a:solidFill>
+                  <a:srgbClr val="1C1E21"/>
+                </a:solidFill>
+                <a:effectLst/>
+                <a:latin typeface="system-ui"/>
+              </a:rPr>
+            </a:br>
+            <a:endParaRPr lang="en-US" dirty="0"/>
+          </a:p>
+          <a:p>
             <a:endParaRPr lang="en-US" dirty="0"/>
           </a:p>
         </p:txBody>
@@ -8408,7 +8303,7 @@
     </p:spTree>
     <p:extLst>
       <p:ext uri="{BB962C8B-B14F-4D97-AF65-F5344CB8AC3E}">
-        <p14:creationId xmlns:p14="http://schemas.microsoft.com/office/powerpoint/2010/main" val="2605736080"/>
+        <p14:creationId xmlns:p14="http://schemas.microsoft.com/office/powerpoint/2010/main" val="2530753063"/>
       </p:ext>
     </p:extLst>
   </p:cSld>
@@ -8462,7 +8357,121 @@
           <a:bodyPr/>
           <a:lstStyle/>
           <a:p>
-            <a:pPr algn="l"/>
+            <a:pPr marL="0" marR="0" lvl="0" indent="0" algn="l" defTabSz="914400" rtl="0" eaLnBrk="1" fontAlgn="auto" latinLnBrk="0" hangingPunct="1">
+              <a:lnSpc>
+                <a:spcPct val="100000"/>
+              </a:lnSpc>
+              <a:spcBef>
+                <a:spcPts val="0"/>
+              </a:spcBef>
+              <a:spcAft>
+                <a:spcPts val="0"/>
+              </a:spcAft>
+              <a:buClrTx/>
+              <a:buSzTx/>
+              <a:buFontTx/>
+              <a:buNone/>
+              <a:tabLst/>
+              <a:defRPr/>
+            </a:pPr>
+            <a:r>
+              <a:rPr lang="en-US" b="0" i="0" dirty="0">
+                <a:solidFill>
+                  <a:srgbClr val="1C1E21"/>
+                </a:solidFill>
+                <a:effectLst/>
+                <a:latin typeface="system-ui"/>
+              </a:rPr>
+              <a:t>Setup of Redux requires creation of actions, action creators, constants and reducers. </a:t>
+            </a:r>
+            <a:br>
+              <a:rPr lang="en-US" b="0" i="0" dirty="0">
+                <a:solidFill>
+                  <a:srgbClr val="1C1E21"/>
+                </a:solidFill>
+                <a:effectLst/>
+                <a:latin typeface="system-ui"/>
+              </a:rPr>
+            </a:br>
+            <a:br>
+              <a:rPr lang="en-US" b="0" i="0" dirty="0">
+                <a:solidFill>
+                  <a:srgbClr val="1C1E21"/>
+                </a:solidFill>
+                <a:effectLst/>
+                <a:latin typeface="system-ui"/>
+              </a:rPr>
+            </a:br>
+            <a:r>
+              <a:rPr lang="en-US" b="0" i="0" dirty="0">
+                <a:solidFill>
+                  <a:srgbClr val="1C1E21"/>
+                </a:solidFill>
+                <a:effectLst/>
+                <a:latin typeface="system-ui"/>
+              </a:rPr>
+              <a:t>One of the critics of redux was the amount of code needed to be written for setup, boilerplate code. </a:t>
+            </a:r>
+            <a:br>
+              <a:rPr lang="en-US" b="0" i="0" dirty="0">
+                <a:solidFill>
+                  <a:srgbClr val="1C1E21"/>
+                </a:solidFill>
+                <a:effectLst/>
+                <a:latin typeface="system-ui"/>
+              </a:rPr>
+            </a:br>
+            <a:br>
+              <a:rPr lang="en-US" b="0" i="0" dirty="0">
+                <a:solidFill>
+                  <a:srgbClr val="1C1E21"/>
+                </a:solidFill>
+                <a:effectLst/>
+                <a:latin typeface="system-ui"/>
+              </a:rPr>
+            </a:br>
+            <a:r>
+              <a:rPr lang="en-US" b="0" i="0" dirty="0">
+                <a:solidFill>
+                  <a:srgbClr val="1C1E21"/>
+                </a:solidFill>
+                <a:effectLst/>
+                <a:latin typeface="system-ui"/>
+              </a:rPr>
+              <a:t>Redux released </a:t>
+            </a:r>
+            <a:r>
+              <a:rPr lang="en-US" b="0" i="0" dirty="0" err="1">
+                <a:solidFill>
+                  <a:srgbClr val="1C1E21"/>
+                </a:solidFill>
+                <a:effectLst/>
+                <a:latin typeface="system-ui"/>
+              </a:rPr>
+              <a:t>reduxjs</a:t>
+            </a:r>
+            <a:r>
+              <a:rPr lang="en-US" b="0" i="0" dirty="0">
+                <a:solidFill>
+                  <a:srgbClr val="1C1E21"/>
+                </a:solidFill>
+                <a:effectLst/>
+                <a:latin typeface="system-ui"/>
+              </a:rPr>
+              <a:t>/toolkit to reduce the amount of code needed to be written. </a:t>
+            </a:r>
+            <a:br>
+              <a:rPr lang="en-US" b="0" i="0" dirty="0">
+                <a:solidFill>
+                  <a:srgbClr val="1C1E21"/>
+                </a:solidFill>
+                <a:effectLst/>
+                <a:latin typeface="system-ui"/>
+              </a:rPr>
+            </a:br>
+            <a:endParaRPr lang="en-US" dirty="0"/>
+          </a:p>
+          <a:p>
             <a:endParaRPr lang="en-US" dirty="0"/>
           </a:p>
         </p:txBody>
@@ -8493,7 +8502,7 @@
     </p:spTree>
     <p:extLst>
       <p:ext uri="{BB962C8B-B14F-4D97-AF65-F5344CB8AC3E}">
-        <p14:creationId xmlns:p14="http://schemas.microsoft.com/office/powerpoint/2010/main" val="3424261421"/>
+        <p14:creationId xmlns:p14="http://schemas.microsoft.com/office/powerpoint/2010/main" val="1667897536"/>
       </p:ext>
     </p:extLst>
   </p:cSld>
@@ -8547,302 +8556,6 @@
           <a:bodyPr/>
           <a:lstStyle/>
           <a:p>
-            <a:pPr algn="l"/>
-            <a:r>
-              <a:rPr lang="en-US" b="0" i="0" dirty="0">
-                <a:solidFill>
-                  <a:srgbClr val="1C1E21"/>
-                </a:solidFill>
-                <a:effectLst/>
-                <a:latin typeface="system-ui"/>
-              </a:rPr>
-              <a:t>A </a:t>
-            </a:r>
-            <a:r>
-              <a:rPr lang="en-US" b="1" i="0" dirty="0" err="1">
-                <a:solidFill>
-                  <a:srgbClr val="1C1E21"/>
-                </a:solidFill>
-                <a:effectLst/>
-                <a:latin typeface="system-ui"/>
-              </a:rPr>
-              <a:t>thunk</a:t>
-            </a:r>
-            <a:r>
-              <a:rPr lang="en-US" b="0" i="0" dirty="0">
-                <a:solidFill>
-                  <a:srgbClr val="1C1E21"/>
-                </a:solidFill>
-                <a:effectLst/>
-                <a:latin typeface="system-ui"/>
-              </a:rPr>
-              <a:t> is a specific kind of Redux function that can contain asynchronous logic. </a:t>
-            </a:r>
-            <a:r>
-              <a:rPr lang="en-US" b="0" i="0" dirty="0" err="1">
-                <a:solidFill>
-                  <a:srgbClr val="1C1E21"/>
-                </a:solidFill>
-                <a:effectLst/>
-                <a:latin typeface="system-ui"/>
-              </a:rPr>
-              <a:t>Thunks</a:t>
-            </a:r>
-            <a:r>
-              <a:rPr lang="en-US" b="0" i="0" dirty="0">
-                <a:solidFill>
-                  <a:srgbClr val="1C1E21"/>
-                </a:solidFill>
-                <a:effectLst/>
-                <a:latin typeface="system-ui"/>
-              </a:rPr>
-              <a:t> are written using two functions:</a:t>
-            </a:r>
-          </a:p>
-          <a:p>
-            <a:pPr marL="171450" indent="-171450" algn="l">
-              <a:buFont typeface="Arial" panose="020B0604020202020204" pitchFamily="34" charset="0"/>
-              <a:buChar char="•"/>
-            </a:pPr>
-            <a:r>
-              <a:rPr lang="en-US" b="0" i="0" dirty="0">
-                <a:solidFill>
-                  <a:srgbClr val="1C1E21"/>
-                </a:solidFill>
-                <a:effectLst/>
-                <a:latin typeface="system-ui"/>
-              </a:rPr>
-              <a:t>An inside </a:t>
-            </a:r>
-            <a:r>
-              <a:rPr lang="en-US" b="0" i="0" dirty="0" err="1">
-                <a:solidFill>
-                  <a:srgbClr val="1C1E21"/>
-                </a:solidFill>
-                <a:effectLst/>
-                <a:latin typeface="system-ui"/>
-              </a:rPr>
-              <a:t>thunk</a:t>
-            </a:r>
-            <a:r>
-              <a:rPr lang="en-US" b="0" i="0" dirty="0">
-                <a:solidFill>
-                  <a:srgbClr val="1C1E21"/>
-                </a:solidFill>
-                <a:effectLst/>
-                <a:latin typeface="system-ui"/>
-              </a:rPr>
-              <a:t> function, which gets dispatch and </a:t>
-            </a:r>
-            <a:r>
-              <a:rPr lang="en-US" b="0" i="0" dirty="0" err="1">
-                <a:solidFill>
-                  <a:srgbClr val="1C1E21"/>
-                </a:solidFill>
-                <a:effectLst/>
-                <a:latin typeface="system-ui"/>
-              </a:rPr>
-              <a:t>getState</a:t>
-            </a:r>
-            <a:r>
-              <a:rPr lang="en-US" b="0" i="0" dirty="0">
-                <a:solidFill>
-                  <a:srgbClr val="1C1E21"/>
-                </a:solidFill>
-                <a:effectLst/>
-                <a:latin typeface="system-ui"/>
-              </a:rPr>
-              <a:t> as arguments</a:t>
-            </a:r>
-          </a:p>
-          <a:p>
-            <a:pPr marL="171450" indent="-171450" algn="l">
-              <a:buFont typeface="Arial" panose="020B0604020202020204" pitchFamily="34" charset="0"/>
-              <a:buChar char="•"/>
-            </a:pPr>
-            <a:r>
-              <a:rPr lang="en-US" b="0" i="0" dirty="0">
-                <a:solidFill>
-                  <a:srgbClr val="1C1E21"/>
-                </a:solidFill>
-                <a:effectLst/>
-                <a:latin typeface="system-ui"/>
-              </a:rPr>
-              <a:t>The outside creator function, which creates and returns the </a:t>
-            </a:r>
-            <a:r>
-              <a:rPr lang="en-US" b="0" i="0" dirty="0" err="1">
-                <a:solidFill>
-                  <a:srgbClr val="1C1E21"/>
-                </a:solidFill>
-                <a:effectLst/>
-                <a:latin typeface="system-ui"/>
-              </a:rPr>
-              <a:t>thunk</a:t>
-            </a:r>
-            <a:r>
-              <a:rPr lang="en-US" b="0" i="0" dirty="0">
-                <a:solidFill>
-                  <a:srgbClr val="1C1E21"/>
-                </a:solidFill>
-                <a:effectLst/>
-                <a:latin typeface="system-ui"/>
-              </a:rPr>
-              <a:t> function</a:t>
-            </a:r>
-          </a:p>
-          <a:p>
-            <a:br>
-              <a:rPr lang="en-US" dirty="0"/>
-            </a:br>
-            <a:r>
-              <a:rPr lang="en-US" dirty="0"/>
-              <a:t>H</a:t>
-            </a:r>
-            <a:r>
-              <a:rPr lang="en-US" b="0" i="0" dirty="0">
-                <a:solidFill>
-                  <a:srgbClr val="1C1E21"/>
-                </a:solidFill>
-                <a:effectLst/>
-                <a:latin typeface="system-ui"/>
-              </a:rPr>
-              <a:t>owever, using </a:t>
-            </a:r>
-            <a:r>
-              <a:rPr lang="en-US" b="0" i="0" dirty="0" err="1">
-                <a:solidFill>
-                  <a:srgbClr val="1C1E21"/>
-                </a:solidFill>
-                <a:effectLst/>
-                <a:latin typeface="system-ui"/>
-              </a:rPr>
-              <a:t>thunks</a:t>
-            </a:r>
-            <a:r>
-              <a:rPr lang="en-US" b="0" i="0" dirty="0">
-                <a:solidFill>
-                  <a:srgbClr val="1C1E21"/>
-                </a:solidFill>
-                <a:effectLst/>
-                <a:latin typeface="system-ui"/>
-              </a:rPr>
-              <a:t> requires that the </a:t>
-            </a:r>
-            <a:r>
-              <a:rPr lang="en-US" dirty="0"/>
-              <a:t>redux-</a:t>
-            </a:r>
-            <a:r>
-              <a:rPr lang="en-US" dirty="0" err="1"/>
-              <a:t>thunk</a:t>
-            </a:r>
-            <a:r>
-              <a:rPr lang="en-US" b="0" i="0" dirty="0">
-                <a:solidFill>
-                  <a:srgbClr val="1C1E21"/>
-                </a:solidFill>
-                <a:effectLst/>
-                <a:latin typeface="system-ui"/>
-              </a:rPr>
-              <a:t> </a:t>
-            </a:r>
-            <a:r>
-              <a:rPr lang="en-US" b="0" i="1" dirty="0">
-                <a:solidFill>
-                  <a:srgbClr val="1C1E21"/>
-                </a:solidFill>
-                <a:effectLst/>
-                <a:latin typeface="system-ui"/>
-              </a:rPr>
-              <a:t>middleware</a:t>
-            </a:r>
-            <a:r>
-              <a:rPr lang="en-US" b="0" i="0" dirty="0">
-                <a:solidFill>
-                  <a:srgbClr val="1C1E21"/>
-                </a:solidFill>
-                <a:effectLst/>
-                <a:latin typeface="system-ui"/>
-              </a:rPr>
-              <a:t> (a type of plugin for Redux) be added to the Redux store when it's created. Fortunately, Redux Toolkit's </a:t>
-            </a:r>
-            <a:r>
-              <a:rPr lang="en-US" dirty="0" err="1"/>
-              <a:t>configureStore</a:t>
-            </a:r>
-            <a:r>
-              <a:rPr lang="en-US" b="0" i="0" dirty="0">
-                <a:solidFill>
-                  <a:srgbClr val="1C1E21"/>
-                </a:solidFill>
-                <a:effectLst/>
-                <a:latin typeface="system-ui"/>
-              </a:rPr>
-              <a:t> function already sets that up for us automatically, so we can go ahead and use </a:t>
-            </a:r>
-            <a:r>
-              <a:rPr lang="en-US" b="0" i="0" dirty="0" err="1">
-                <a:solidFill>
-                  <a:srgbClr val="1C1E21"/>
-                </a:solidFill>
-                <a:effectLst/>
-                <a:latin typeface="system-ui"/>
-              </a:rPr>
-              <a:t>thunks</a:t>
-            </a:r>
-            <a:r>
-              <a:rPr lang="en-US" b="0" i="0" dirty="0">
-                <a:solidFill>
-                  <a:srgbClr val="1C1E21"/>
-                </a:solidFill>
-                <a:effectLst/>
-                <a:latin typeface="system-ui"/>
-              </a:rPr>
-              <a:t> here.</a:t>
-            </a:r>
-            <a:endParaRPr lang="en-US" dirty="0"/>
-          </a:p>
-          <a:p>
-            <a:pPr algn="l"/>
-            <a:endParaRPr lang="en-US" dirty="0"/>
-          </a:p>
-          <a:p>
-            <a:pPr algn="l"/>
-            <a:endParaRPr lang="en-US" dirty="0"/>
-          </a:p>
-          <a:p>
-            <a:pPr algn="l"/>
-            <a:r>
-              <a:rPr lang="en-US" dirty="0"/>
-              <a:t>Middleware = </a:t>
-            </a:r>
-            <a:r>
-              <a:rPr lang="en-US" b="0" i="0" dirty="0">
-                <a:solidFill>
-                  <a:srgbClr val="171717"/>
-                </a:solidFill>
-                <a:effectLst/>
-                <a:latin typeface="Segoe UI" panose="020B0502040204020203" pitchFamily="34" charset="0"/>
-              </a:rPr>
-              <a:t>Middleware is software that's assembled into an app pipeline.</a:t>
-            </a:r>
-          </a:p>
-          <a:p>
-            <a:pPr algn="l"/>
-            <a:r>
-              <a:rPr lang="en-US" b="0" i="0" dirty="0">
-                <a:solidFill>
-                  <a:srgbClr val="171717"/>
-                </a:solidFill>
-                <a:effectLst/>
-                <a:latin typeface="Segoe UI" panose="020B0502040204020203" pitchFamily="34" charset="0"/>
-              </a:rPr>
-              <a:t>When an action is dispatched, we can insert middleware that will be run each time. </a:t>
-            </a:r>
-          </a:p>
-          <a:p>
-            <a:pPr algn="l"/>
             <a:endParaRPr lang="en-US" dirty="0"/>
           </a:p>
         </p:txBody>
@@ -8873,7 +8586,7 @@
     </p:spTree>
     <p:extLst>
       <p:ext uri="{BB962C8B-B14F-4D97-AF65-F5344CB8AC3E}">
-        <p14:creationId xmlns:p14="http://schemas.microsoft.com/office/powerpoint/2010/main" val="1806107557"/>
+        <p14:creationId xmlns:p14="http://schemas.microsoft.com/office/powerpoint/2010/main" val="2605736080"/>
       </p:ext>
     </p:extLst>
   </p:cSld>
@@ -8927,6 +8640,7 @@
           <a:bodyPr/>
           <a:lstStyle/>
           <a:p>
+            <a:pPr algn="l"/>
             <a:endParaRPr lang="en-US" dirty="0"/>
           </a:p>
         </p:txBody>
@@ -8957,7 +8671,7 @@
     </p:spTree>
     <p:extLst>
       <p:ext uri="{BB962C8B-B14F-4D97-AF65-F5344CB8AC3E}">
-        <p14:creationId xmlns:p14="http://schemas.microsoft.com/office/powerpoint/2010/main" val="973698515"/>
+        <p14:creationId xmlns:p14="http://schemas.microsoft.com/office/powerpoint/2010/main" val="3424261421"/>
       </p:ext>
     </p:extLst>
   </p:cSld>
@@ -9330,6 +9044,302 @@
           <a:bodyPr/>
           <a:lstStyle/>
           <a:p>
+            <a:pPr algn="l"/>
+            <a:r>
+              <a:rPr lang="en-US" b="0" i="0" dirty="0">
+                <a:solidFill>
+                  <a:srgbClr val="1C1E21"/>
+                </a:solidFill>
+                <a:effectLst/>
+                <a:latin typeface="system-ui"/>
+              </a:rPr>
+              <a:t>A </a:t>
+            </a:r>
+            <a:r>
+              <a:rPr lang="en-US" b="1" i="0" dirty="0" err="1">
+                <a:solidFill>
+                  <a:srgbClr val="1C1E21"/>
+                </a:solidFill>
+                <a:effectLst/>
+                <a:latin typeface="system-ui"/>
+              </a:rPr>
+              <a:t>thunk</a:t>
+            </a:r>
+            <a:r>
+              <a:rPr lang="en-US" b="0" i="0" dirty="0">
+                <a:solidFill>
+                  <a:srgbClr val="1C1E21"/>
+                </a:solidFill>
+                <a:effectLst/>
+                <a:latin typeface="system-ui"/>
+              </a:rPr>
+              <a:t> is a specific kind of Redux function that can contain asynchronous logic. </a:t>
+            </a:r>
+            <a:r>
+              <a:rPr lang="en-US" b="0" i="0" dirty="0" err="1">
+                <a:solidFill>
+                  <a:srgbClr val="1C1E21"/>
+                </a:solidFill>
+                <a:effectLst/>
+                <a:latin typeface="system-ui"/>
+              </a:rPr>
+              <a:t>Thunks</a:t>
+            </a:r>
+            <a:r>
+              <a:rPr lang="en-US" b="0" i="0" dirty="0">
+                <a:solidFill>
+                  <a:srgbClr val="1C1E21"/>
+                </a:solidFill>
+                <a:effectLst/>
+                <a:latin typeface="system-ui"/>
+              </a:rPr>
+              <a:t> are written using two functions:</a:t>
+            </a:r>
+          </a:p>
+          <a:p>
+            <a:pPr marL="171450" indent="-171450" algn="l">
+              <a:buFont typeface="Arial" panose="020B0604020202020204" pitchFamily="34" charset="0"/>
+              <a:buChar char="•"/>
+            </a:pPr>
+            <a:r>
+              <a:rPr lang="en-US" b="0" i="0" dirty="0">
+                <a:solidFill>
+                  <a:srgbClr val="1C1E21"/>
+                </a:solidFill>
+                <a:effectLst/>
+                <a:latin typeface="system-ui"/>
+              </a:rPr>
+              <a:t>An inside </a:t>
+            </a:r>
+            <a:r>
+              <a:rPr lang="en-US" b="0" i="0" dirty="0" err="1">
+                <a:solidFill>
+                  <a:srgbClr val="1C1E21"/>
+                </a:solidFill>
+                <a:effectLst/>
+                <a:latin typeface="system-ui"/>
+              </a:rPr>
+              <a:t>thunk</a:t>
+            </a:r>
+            <a:r>
+              <a:rPr lang="en-US" b="0" i="0" dirty="0">
+                <a:solidFill>
+                  <a:srgbClr val="1C1E21"/>
+                </a:solidFill>
+                <a:effectLst/>
+                <a:latin typeface="system-ui"/>
+              </a:rPr>
+              <a:t> function, which gets dispatch and </a:t>
+            </a:r>
+            <a:r>
+              <a:rPr lang="en-US" b="0" i="0" dirty="0" err="1">
+                <a:solidFill>
+                  <a:srgbClr val="1C1E21"/>
+                </a:solidFill>
+                <a:effectLst/>
+                <a:latin typeface="system-ui"/>
+              </a:rPr>
+              <a:t>getState</a:t>
+            </a:r>
+            <a:r>
+              <a:rPr lang="en-US" b="0" i="0" dirty="0">
+                <a:solidFill>
+                  <a:srgbClr val="1C1E21"/>
+                </a:solidFill>
+                <a:effectLst/>
+                <a:latin typeface="system-ui"/>
+              </a:rPr>
+              <a:t> as arguments</a:t>
+            </a:r>
+          </a:p>
+          <a:p>
+            <a:pPr marL="171450" indent="-171450" algn="l">
+              <a:buFont typeface="Arial" panose="020B0604020202020204" pitchFamily="34" charset="0"/>
+              <a:buChar char="•"/>
+            </a:pPr>
+            <a:r>
+              <a:rPr lang="en-US" b="0" i="0" dirty="0">
+                <a:solidFill>
+                  <a:srgbClr val="1C1E21"/>
+                </a:solidFill>
+                <a:effectLst/>
+                <a:latin typeface="system-ui"/>
+              </a:rPr>
+              <a:t>The outside creator function, which creates and returns the </a:t>
+            </a:r>
+            <a:r>
+              <a:rPr lang="en-US" b="0" i="0" dirty="0" err="1">
+                <a:solidFill>
+                  <a:srgbClr val="1C1E21"/>
+                </a:solidFill>
+                <a:effectLst/>
+                <a:latin typeface="system-ui"/>
+              </a:rPr>
+              <a:t>thunk</a:t>
+            </a:r>
+            <a:r>
+              <a:rPr lang="en-US" b="0" i="0" dirty="0">
+                <a:solidFill>
+                  <a:srgbClr val="1C1E21"/>
+                </a:solidFill>
+                <a:effectLst/>
+                <a:latin typeface="system-ui"/>
+              </a:rPr>
+              <a:t> function</a:t>
+            </a:r>
+          </a:p>
+          <a:p>
+            <a:br>
+              <a:rPr lang="en-US" dirty="0"/>
+            </a:br>
+            <a:r>
+              <a:rPr lang="en-US" dirty="0"/>
+              <a:t>H</a:t>
+            </a:r>
+            <a:r>
+              <a:rPr lang="en-US" b="0" i="0" dirty="0">
+                <a:solidFill>
+                  <a:srgbClr val="1C1E21"/>
+                </a:solidFill>
+                <a:effectLst/>
+                <a:latin typeface="system-ui"/>
+              </a:rPr>
+              <a:t>owever, using </a:t>
+            </a:r>
+            <a:r>
+              <a:rPr lang="en-US" b="0" i="0" dirty="0" err="1">
+                <a:solidFill>
+                  <a:srgbClr val="1C1E21"/>
+                </a:solidFill>
+                <a:effectLst/>
+                <a:latin typeface="system-ui"/>
+              </a:rPr>
+              <a:t>thunks</a:t>
+            </a:r>
+            <a:r>
+              <a:rPr lang="en-US" b="0" i="0" dirty="0">
+                <a:solidFill>
+                  <a:srgbClr val="1C1E21"/>
+                </a:solidFill>
+                <a:effectLst/>
+                <a:latin typeface="system-ui"/>
+              </a:rPr>
+              <a:t> requires that the </a:t>
+            </a:r>
+            <a:r>
+              <a:rPr lang="en-US" dirty="0"/>
+              <a:t>redux-</a:t>
+            </a:r>
+            <a:r>
+              <a:rPr lang="en-US" dirty="0" err="1"/>
+              <a:t>thunk</a:t>
+            </a:r>
+            <a:r>
+              <a:rPr lang="en-US" b="0" i="0" dirty="0">
+                <a:solidFill>
+                  <a:srgbClr val="1C1E21"/>
+                </a:solidFill>
+                <a:effectLst/>
+                <a:latin typeface="system-ui"/>
+              </a:rPr>
+              <a:t> </a:t>
+            </a:r>
+            <a:r>
+              <a:rPr lang="en-US" b="0" i="1" dirty="0">
+                <a:solidFill>
+                  <a:srgbClr val="1C1E21"/>
+                </a:solidFill>
+                <a:effectLst/>
+                <a:latin typeface="system-ui"/>
+              </a:rPr>
+              <a:t>middleware</a:t>
+            </a:r>
+            <a:r>
+              <a:rPr lang="en-US" b="0" i="0" dirty="0">
+                <a:solidFill>
+                  <a:srgbClr val="1C1E21"/>
+                </a:solidFill>
+                <a:effectLst/>
+                <a:latin typeface="system-ui"/>
+              </a:rPr>
+              <a:t> (a type of plugin for Redux) be added to the Redux store when it's created. Fortunately, Redux Toolkit's </a:t>
+            </a:r>
+            <a:r>
+              <a:rPr lang="en-US" dirty="0" err="1"/>
+              <a:t>configureStore</a:t>
+            </a:r>
+            <a:r>
+              <a:rPr lang="en-US" b="0" i="0" dirty="0">
+                <a:solidFill>
+                  <a:srgbClr val="1C1E21"/>
+                </a:solidFill>
+                <a:effectLst/>
+                <a:latin typeface="system-ui"/>
+              </a:rPr>
+              <a:t> function already sets that up for us automatically, so we can go ahead and use </a:t>
+            </a:r>
+            <a:r>
+              <a:rPr lang="en-US" b="0" i="0" dirty="0" err="1">
+                <a:solidFill>
+                  <a:srgbClr val="1C1E21"/>
+                </a:solidFill>
+                <a:effectLst/>
+                <a:latin typeface="system-ui"/>
+              </a:rPr>
+              <a:t>thunks</a:t>
+            </a:r>
+            <a:r>
+              <a:rPr lang="en-US" b="0" i="0" dirty="0">
+                <a:solidFill>
+                  <a:srgbClr val="1C1E21"/>
+                </a:solidFill>
+                <a:effectLst/>
+                <a:latin typeface="system-ui"/>
+              </a:rPr>
+              <a:t> here.</a:t>
+            </a:r>
+            <a:endParaRPr lang="en-US" dirty="0"/>
+          </a:p>
+          <a:p>
+            <a:pPr algn="l"/>
+            <a:endParaRPr lang="en-US" dirty="0"/>
+          </a:p>
+          <a:p>
+            <a:pPr algn="l"/>
+            <a:endParaRPr lang="en-US" dirty="0"/>
+          </a:p>
+          <a:p>
+            <a:pPr algn="l"/>
+            <a:r>
+              <a:rPr lang="en-US" dirty="0"/>
+              <a:t>Middleware = </a:t>
+            </a:r>
+            <a:r>
+              <a:rPr lang="en-US" b="0" i="0" dirty="0">
+                <a:solidFill>
+                  <a:srgbClr val="171717"/>
+                </a:solidFill>
+                <a:effectLst/>
+                <a:latin typeface="Segoe UI" panose="020B0502040204020203" pitchFamily="34" charset="0"/>
+              </a:rPr>
+              <a:t>Middleware is software that's assembled into an app pipeline.</a:t>
+            </a:r>
+          </a:p>
+          <a:p>
+            <a:pPr algn="l"/>
+            <a:r>
+              <a:rPr lang="en-US" b="0" i="0" dirty="0">
+                <a:solidFill>
+                  <a:srgbClr val="171717"/>
+                </a:solidFill>
+                <a:effectLst/>
+                <a:latin typeface="Segoe UI" panose="020B0502040204020203" pitchFamily="34" charset="0"/>
+              </a:rPr>
+              <a:t>When an action is dispatched, we can insert middleware that will be run each time. </a:t>
+            </a:r>
+          </a:p>
+          <a:p>
+            <a:pPr algn="l"/>
             <a:endParaRPr lang="en-US" dirty="0"/>
           </a:p>
         </p:txBody>
@@ -9352,6 +9362,174 @@
             <a:fld id="{DEBE320E-712D-4170-85C0-E5996912513C}" type="slidenum">
               <a:rPr lang="en-US" smtClean="0"/>
               <a:t>30</a:t>
+            </a:fld>
+            <a:endParaRPr lang="en-US"/>
+          </a:p>
+        </p:txBody>
+      </p:sp>
+    </p:spTree>
+    <p:extLst>
+      <p:ext uri="{BB962C8B-B14F-4D97-AF65-F5344CB8AC3E}">
+        <p14:creationId xmlns:p14="http://schemas.microsoft.com/office/powerpoint/2010/main" val="1806107557"/>
+      </p:ext>
+    </p:extLst>
+  </p:cSld>
+  <p:clrMapOvr>
+    <a:masterClrMapping/>
+  </p:clrMapOvr>
+</p:notes>
+</file>
+
+<file path=ppt/notesSlides/notesSlide31.xml><?xml version="1.0" encoding="utf-8"?>
+<p:notes xmlns:a="http://schemas.openxmlformats.org/drawingml/2006/main" xmlns:r="http://schemas.openxmlformats.org/officeDocument/2006/relationships" xmlns:p="http://schemas.openxmlformats.org/presentationml/2006/main">
+  <p:cSld>
+    <p:spTree>
+      <p:nvGrpSpPr>
+        <p:cNvPr id="1" name=""/>
+        <p:cNvGrpSpPr/>
+        <p:nvPr/>
+      </p:nvGrpSpPr>
+      <p:grpSpPr>
+        <a:xfrm>
+          <a:off x="0" y="0"/>
+          <a:ext cx="0" cy="0"/>
+          <a:chOff x="0" y="0"/>
+          <a:chExt cx="0" cy="0"/>
+        </a:xfrm>
+      </p:grpSpPr>
+      <p:sp>
+        <p:nvSpPr>
+          <p:cNvPr id="2" name="Slide Image Placeholder 1"/>
+          <p:cNvSpPr>
+            <a:spLocks noGrp="1" noRot="1" noChangeAspect="1"/>
+          </p:cNvSpPr>
+          <p:nvPr>
+            <p:ph type="sldImg"/>
+          </p:nvPr>
+        </p:nvSpPr>
+        <p:spPr/>
+      </p:sp>
+      <p:sp>
+        <p:nvSpPr>
+          <p:cNvPr id="3" name="Notes Placeholder 2"/>
+          <p:cNvSpPr>
+            <a:spLocks noGrp="1"/>
+          </p:cNvSpPr>
+          <p:nvPr>
+            <p:ph type="body" idx="1"/>
+          </p:nvPr>
+        </p:nvSpPr>
+        <p:spPr/>
+        <p:txBody>
+          <a:bodyPr/>
+          <a:lstStyle/>
+          <a:p>
+            <a:endParaRPr lang="en-US" dirty="0"/>
+          </a:p>
+        </p:txBody>
+      </p:sp>
+      <p:sp>
+        <p:nvSpPr>
+          <p:cNvPr id="4" name="Slide Number Placeholder 3"/>
+          <p:cNvSpPr>
+            <a:spLocks noGrp="1"/>
+          </p:cNvSpPr>
+          <p:nvPr>
+            <p:ph type="sldNum" sz="quarter" idx="5"/>
+          </p:nvPr>
+        </p:nvSpPr>
+        <p:spPr/>
+        <p:txBody>
+          <a:bodyPr/>
+          <a:lstStyle/>
+          <a:p>
+            <a:fld id="{DEBE320E-712D-4170-85C0-E5996912513C}" type="slidenum">
+              <a:rPr lang="en-US" smtClean="0"/>
+              <a:t>31</a:t>
+            </a:fld>
+            <a:endParaRPr lang="en-US"/>
+          </a:p>
+        </p:txBody>
+      </p:sp>
+    </p:spTree>
+    <p:extLst>
+      <p:ext uri="{BB962C8B-B14F-4D97-AF65-F5344CB8AC3E}">
+        <p14:creationId xmlns:p14="http://schemas.microsoft.com/office/powerpoint/2010/main" val="973698515"/>
+      </p:ext>
+    </p:extLst>
+  </p:cSld>
+  <p:clrMapOvr>
+    <a:masterClrMapping/>
+  </p:clrMapOvr>
+</p:notes>
+</file>
+
+<file path=ppt/notesSlides/notesSlide32.xml><?xml version="1.0" encoding="utf-8"?>
+<p:notes xmlns:a="http://schemas.openxmlformats.org/drawingml/2006/main" xmlns:r="http://schemas.openxmlformats.org/officeDocument/2006/relationships" xmlns:p="http://schemas.openxmlformats.org/presentationml/2006/main">
+  <p:cSld>
+    <p:spTree>
+      <p:nvGrpSpPr>
+        <p:cNvPr id="1" name=""/>
+        <p:cNvGrpSpPr/>
+        <p:nvPr/>
+      </p:nvGrpSpPr>
+      <p:grpSpPr>
+        <a:xfrm>
+          <a:off x="0" y="0"/>
+          <a:ext cx="0" cy="0"/>
+          <a:chOff x="0" y="0"/>
+          <a:chExt cx="0" cy="0"/>
+        </a:xfrm>
+      </p:grpSpPr>
+      <p:sp>
+        <p:nvSpPr>
+          <p:cNvPr id="2" name="Slide Image Placeholder 1"/>
+          <p:cNvSpPr>
+            <a:spLocks noGrp="1" noRot="1" noChangeAspect="1"/>
+          </p:cNvSpPr>
+          <p:nvPr>
+            <p:ph type="sldImg"/>
+          </p:nvPr>
+        </p:nvSpPr>
+        <p:spPr/>
+      </p:sp>
+      <p:sp>
+        <p:nvSpPr>
+          <p:cNvPr id="3" name="Notes Placeholder 2"/>
+          <p:cNvSpPr>
+            <a:spLocks noGrp="1"/>
+          </p:cNvSpPr>
+          <p:nvPr>
+            <p:ph type="body" idx="1"/>
+          </p:nvPr>
+        </p:nvSpPr>
+        <p:spPr/>
+        <p:txBody>
+          <a:bodyPr/>
+          <a:lstStyle/>
+          <a:p>
+            <a:endParaRPr lang="en-US" dirty="0"/>
+          </a:p>
+        </p:txBody>
+      </p:sp>
+      <p:sp>
+        <p:nvSpPr>
+          <p:cNvPr id="4" name="Slide Number Placeholder 3"/>
+          <p:cNvSpPr>
+            <a:spLocks noGrp="1"/>
+          </p:cNvSpPr>
+          <p:nvPr>
+            <p:ph type="sldNum" sz="quarter" idx="5"/>
+          </p:nvPr>
+        </p:nvSpPr>
+        <p:spPr/>
+        <p:txBody>
+          <a:bodyPr/>
+          <a:lstStyle/>
+          <a:p>
+            <a:fld id="{DEBE320E-712D-4170-85C0-E5996912513C}" type="slidenum">
+              <a:rPr lang="en-US" smtClean="0"/>
+              <a:t>32</a:t>
             </a:fld>
             <a:endParaRPr lang="en-US"/>
           </a:p>
@@ -13821,6 +13999,563 @@
           <a:chExt cx="0" cy="0"/>
         </a:xfrm>
       </p:grpSpPr>
+      <p:pic>
+        <p:nvPicPr>
+          <p:cNvPr id="5" name="Picture 4">
+            <a:extLst>
+              <a:ext uri="{FF2B5EF4-FFF2-40B4-BE49-F238E27FC236}">
+                <a16:creationId xmlns:a16="http://schemas.microsoft.com/office/drawing/2014/main" id="{7DA449FF-808E-4C35-BEA6-28845B81C527}"/>
+              </a:ext>
+            </a:extLst>
+          </p:cNvPr>
+          <p:cNvPicPr>
+            <a:picLocks noChangeAspect="1"/>
+          </p:cNvPicPr>
+          <p:nvPr/>
+        </p:nvPicPr>
+        <p:blipFill>
+          <a:blip r:embed="rId3"/>
+          <a:stretch>
+            <a:fillRect/>
+          </a:stretch>
+        </p:blipFill>
+        <p:spPr>
+          <a:xfrm>
+            <a:off x="2577856" y="220662"/>
+            <a:ext cx="6882126" cy="6388100"/>
+          </a:xfrm>
+          <a:prstGeom prst="rect">
+            <a:avLst/>
+          </a:prstGeom>
+        </p:spPr>
+      </p:pic>
+      <p:pic>
+        <p:nvPicPr>
+          <p:cNvPr id="3" name="Graphic 2" descr="Database outline">
+            <a:extLst>
+              <a:ext uri="{FF2B5EF4-FFF2-40B4-BE49-F238E27FC236}">
+                <a16:creationId xmlns:a16="http://schemas.microsoft.com/office/drawing/2014/main" id="{7A5B38CD-2DE9-49AF-A4CD-E7508B9C6DE7}"/>
+              </a:ext>
+            </a:extLst>
+          </p:cNvPr>
+          <p:cNvPicPr>
+            <a:picLocks noChangeAspect="1"/>
+          </p:cNvPicPr>
+          <p:nvPr/>
+        </p:nvPicPr>
+        <p:blipFill>
+          <a:blip r:embed="rId4">
+            <a:extLst>
+              <a:ext uri="{28A0092B-C50C-407E-A947-70E740481C1C}">
+                <a14:useLocalDpi xmlns:a14="http://schemas.microsoft.com/office/drawing/2010/main" val="0"/>
+              </a:ext>
+              <a:ext uri="{96DAC541-7B7A-43D3-8B79-37D633B846F1}">
+                <asvg:svgBlip xmlns:asvg="http://schemas.microsoft.com/office/drawing/2016/SVG/main" r:embed="rId5"/>
+              </a:ext>
+            </a:extLst>
+          </a:blip>
+          <a:stretch>
+            <a:fillRect/>
+          </a:stretch>
+        </p:blipFill>
+        <p:spPr>
+          <a:xfrm>
+            <a:off x="9906713" y="2050756"/>
+            <a:ext cx="1624520" cy="1624520"/>
+          </a:xfrm>
+          <a:prstGeom prst="rect">
+            <a:avLst/>
+          </a:prstGeom>
+        </p:spPr>
+      </p:pic>
+      <p:sp>
+        <p:nvSpPr>
+          <p:cNvPr id="25" name="Arrow: Right 24">
+            <a:extLst>
+              <a:ext uri="{FF2B5EF4-FFF2-40B4-BE49-F238E27FC236}">
+                <a16:creationId xmlns:a16="http://schemas.microsoft.com/office/drawing/2014/main" id="{DA8919B8-3B3F-4CC3-937F-66DA56ACAAF6}"/>
+              </a:ext>
+            </a:extLst>
+          </p:cNvPr>
+          <p:cNvSpPr/>
+          <p:nvPr/>
+        </p:nvSpPr>
+        <p:spPr>
+          <a:xfrm rot="8878934" flipH="1" flipV="1">
+            <a:off x="7381508" y="3369549"/>
+            <a:ext cx="2345390" cy="433856"/>
+          </a:xfrm>
+          <a:prstGeom prst="rightArrow">
+            <a:avLst/>
+          </a:prstGeom>
+        </p:spPr>
+        <p:style>
+          <a:lnRef idx="2">
+            <a:schemeClr val="accent1">
+              <a:shade val="50000"/>
+            </a:schemeClr>
+          </a:lnRef>
+          <a:fillRef idx="1">
+            <a:schemeClr val="accent1"/>
+          </a:fillRef>
+          <a:effectRef idx="0">
+            <a:schemeClr val="accent1"/>
+          </a:effectRef>
+          <a:fontRef idx="minor">
+            <a:schemeClr val="lt1"/>
+          </a:fontRef>
+        </p:style>
+        <p:txBody>
+          <a:bodyPr rtlCol="0" anchor="ctr"/>
+          <a:lstStyle/>
+          <a:p>
+            <a:pPr algn="ctr"/>
+            <a:endParaRPr lang="en-US"/>
+          </a:p>
+        </p:txBody>
+      </p:sp>
+      <p:sp>
+        <p:nvSpPr>
+          <p:cNvPr id="30" name="Arrow: Right 29">
+            <a:extLst>
+              <a:ext uri="{FF2B5EF4-FFF2-40B4-BE49-F238E27FC236}">
+                <a16:creationId xmlns:a16="http://schemas.microsoft.com/office/drawing/2014/main" id="{DFD3317F-38EF-43A1-A4CA-23A57E5E1A87}"/>
+              </a:ext>
+            </a:extLst>
+          </p:cNvPr>
+          <p:cNvSpPr/>
+          <p:nvPr/>
+        </p:nvSpPr>
+        <p:spPr>
+          <a:xfrm rot="19705231" flipH="1" flipV="1">
+            <a:off x="7544627" y="3770570"/>
+            <a:ext cx="2345390" cy="433856"/>
+          </a:xfrm>
+          <a:prstGeom prst="rightArrow">
+            <a:avLst/>
+          </a:prstGeom>
+        </p:spPr>
+        <p:style>
+          <a:lnRef idx="2">
+            <a:schemeClr val="accent1">
+              <a:shade val="50000"/>
+            </a:schemeClr>
+          </a:lnRef>
+          <a:fillRef idx="1">
+            <a:schemeClr val="accent1"/>
+          </a:fillRef>
+          <a:effectRef idx="0">
+            <a:schemeClr val="accent1"/>
+          </a:effectRef>
+          <a:fontRef idx="minor">
+            <a:schemeClr val="lt1"/>
+          </a:fontRef>
+        </p:style>
+        <p:txBody>
+          <a:bodyPr rtlCol="0" anchor="ctr"/>
+          <a:lstStyle/>
+          <a:p>
+            <a:pPr algn="ctr"/>
+            <a:endParaRPr lang="en-US"/>
+          </a:p>
+        </p:txBody>
+      </p:sp>
+      <p:sp>
+        <p:nvSpPr>
+          <p:cNvPr id="31" name="Arrow: Right 30">
+            <a:extLst>
+              <a:ext uri="{FF2B5EF4-FFF2-40B4-BE49-F238E27FC236}">
+                <a16:creationId xmlns:a16="http://schemas.microsoft.com/office/drawing/2014/main" id="{605FACAF-8CA5-4CC9-A6BF-245E65E527F4}"/>
+              </a:ext>
+            </a:extLst>
+          </p:cNvPr>
+          <p:cNvSpPr/>
+          <p:nvPr/>
+        </p:nvSpPr>
+        <p:spPr>
+          <a:xfrm rot="12201511" flipH="1" flipV="1">
+            <a:off x="7995991" y="1247080"/>
+            <a:ext cx="2345390" cy="433856"/>
+          </a:xfrm>
+          <a:prstGeom prst="rightArrow">
+            <a:avLst/>
+          </a:prstGeom>
+        </p:spPr>
+        <p:style>
+          <a:lnRef idx="2">
+            <a:schemeClr val="accent1">
+              <a:shade val="50000"/>
+            </a:schemeClr>
+          </a:lnRef>
+          <a:fillRef idx="1">
+            <a:schemeClr val="accent1"/>
+          </a:fillRef>
+          <a:effectRef idx="0">
+            <a:schemeClr val="accent1"/>
+          </a:effectRef>
+          <a:fontRef idx="minor">
+            <a:schemeClr val="lt1"/>
+          </a:fontRef>
+        </p:style>
+        <p:txBody>
+          <a:bodyPr rtlCol="0" anchor="ctr"/>
+          <a:lstStyle/>
+          <a:p>
+            <a:pPr algn="ctr"/>
+            <a:endParaRPr lang="en-US"/>
+          </a:p>
+        </p:txBody>
+      </p:sp>
+      <p:sp>
+        <p:nvSpPr>
+          <p:cNvPr id="32" name="Arrow: Right 31">
+            <a:extLst>
+              <a:ext uri="{FF2B5EF4-FFF2-40B4-BE49-F238E27FC236}">
+                <a16:creationId xmlns:a16="http://schemas.microsoft.com/office/drawing/2014/main" id="{4B807E6B-532A-4507-9249-FFBA96E0D1E0}"/>
+              </a:ext>
+            </a:extLst>
+          </p:cNvPr>
+          <p:cNvSpPr/>
+          <p:nvPr/>
+        </p:nvSpPr>
+        <p:spPr>
+          <a:xfrm rot="1427808" flipH="1" flipV="1">
+            <a:off x="7755509" y="1626515"/>
+            <a:ext cx="2345390" cy="433856"/>
+          </a:xfrm>
+          <a:prstGeom prst="rightArrow">
+            <a:avLst/>
+          </a:prstGeom>
+        </p:spPr>
+        <p:style>
+          <a:lnRef idx="2">
+            <a:schemeClr val="accent1">
+              <a:shade val="50000"/>
+            </a:schemeClr>
+          </a:lnRef>
+          <a:fillRef idx="1">
+            <a:schemeClr val="accent1"/>
+          </a:fillRef>
+          <a:effectRef idx="0">
+            <a:schemeClr val="accent1"/>
+          </a:effectRef>
+          <a:fontRef idx="minor">
+            <a:schemeClr val="lt1"/>
+          </a:fontRef>
+        </p:style>
+        <p:txBody>
+          <a:bodyPr rtlCol="0" anchor="ctr"/>
+          <a:lstStyle/>
+          <a:p>
+            <a:pPr algn="ctr"/>
+            <a:endParaRPr lang="en-US"/>
+          </a:p>
+        </p:txBody>
+      </p:sp>
+      <p:sp>
+        <p:nvSpPr>
+          <p:cNvPr id="2" name="TextBox 1">
+            <a:extLst>
+              <a:ext uri="{FF2B5EF4-FFF2-40B4-BE49-F238E27FC236}">
+                <a16:creationId xmlns:a16="http://schemas.microsoft.com/office/drawing/2014/main" id="{98CF30BF-5C9F-4C56-B359-F32BBE2AD502}"/>
+              </a:ext>
+            </a:extLst>
+          </p:cNvPr>
+          <p:cNvSpPr txBox="1"/>
+          <p:nvPr/>
+        </p:nvSpPr>
+        <p:spPr>
+          <a:xfrm>
+            <a:off x="10376194" y="3675276"/>
+            <a:ext cx="1155039" cy="646331"/>
+          </a:xfrm>
+          <a:prstGeom prst="rect">
+            <a:avLst/>
+          </a:prstGeom>
+          <a:noFill/>
+        </p:spPr>
+        <p:txBody>
+          <a:bodyPr wrap="square" rtlCol="0">
+            <a:spAutoFit/>
+          </a:bodyPr>
+          <a:lstStyle/>
+          <a:p>
+            <a:r>
+              <a:rPr lang="en-US" b="1" i="1" dirty="0"/>
+              <a:t>Redux </a:t>
+            </a:r>
+          </a:p>
+          <a:p>
+            <a:r>
+              <a:rPr lang="en-US" b="1" i="1" dirty="0"/>
+              <a:t>store</a:t>
+            </a:r>
+          </a:p>
+        </p:txBody>
+      </p:sp>
+    </p:spTree>
+    <p:extLst>
+      <p:ext uri="{BB962C8B-B14F-4D97-AF65-F5344CB8AC3E}">
+        <p14:creationId xmlns:p14="http://schemas.microsoft.com/office/powerpoint/2010/main" val="1630969261"/>
+      </p:ext>
+    </p:extLst>
+  </p:cSld>
+  <p:clrMapOvr>
+    <a:masterClrMapping/>
+  </p:clrMapOvr>
+  <p:timing>
+    <p:tnLst>
+      <p:par>
+        <p:cTn id="1" dur="indefinite" restart="never" nodeType="tmRoot">
+          <p:childTnLst>
+            <p:seq concurrent="1" nextAc="seek">
+              <p:cTn id="2" dur="indefinite" nodeType="mainSeq">
+                <p:childTnLst>
+                  <p:par>
+                    <p:cTn id="3" fill="hold">
+                      <p:stCondLst>
+                        <p:cond delay="indefinite"/>
+                      </p:stCondLst>
+                      <p:childTnLst>
+                        <p:par>
+                          <p:cTn id="4" fill="hold">
+                            <p:stCondLst>
+                              <p:cond delay="0"/>
+                            </p:stCondLst>
+                            <p:childTnLst>
+                              <p:par>
+                                <p:cTn id="5" presetID="1" presetClass="entr" presetSubtype="0" fill="hold" grpId="0" nodeType="clickEffect">
+                                  <p:stCondLst>
+                                    <p:cond delay="0"/>
+                                  </p:stCondLst>
+                                  <p:childTnLst>
+                                    <p:set>
+                                      <p:cBhvr>
+                                        <p:cTn id="6" dur="1" fill="hold">
+                                          <p:stCondLst>
+                                            <p:cond delay="0"/>
+                                          </p:stCondLst>
+                                        </p:cTn>
+                                        <p:tgtEl>
+                                          <p:spTgt spid="25"/>
+                                        </p:tgtEl>
+                                        <p:attrNameLst>
+                                          <p:attrName>style.visibility</p:attrName>
+                                        </p:attrNameLst>
+                                      </p:cBhvr>
+                                      <p:to>
+                                        <p:strVal val="visible"/>
+                                      </p:to>
+                                    </p:set>
+                                  </p:childTnLst>
+                                </p:cTn>
+                              </p:par>
+                              <p:par>
+                                <p:cTn id="7" presetID="1" presetClass="entr" presetSubtype="0" fill="hold" grpId="0" nodeType="withEffect">
+                                  <p:stCondLst>
+                                    <p:cond delay="0"/>
+                                  </p:stCondLst>
+                                  <p:childTnLst>
+                                    <p:set>
+                                      <p:cBhvr>
+                                        <p:cTn id="8" dur="1" fill="hold">
+                                          <p:stCondLst>
+                                            <p:cond delay="0"/>
+                                          </p:stCondLst>
+                                        </p:cTn>
+                                        <p:tgtEl>
+                                          <p:spTgt spid="30"/>
+                                        </p:tgtEl>
+                                        <p:attrNameLst>
+                                          <p:attrName>style.visibility</p:attrName>
+                                        </p:attrNameLst>
+                                      </p:cBhvr>
+                                      <p:to>
+                                        <p:strVal val="visible"/>
+                                      </p:to>
+                                    </p:set>
+                                  </p:childTnLst>
+                                </p:cTn>
+                              </p:par>
+                              <p:par>
+                                <p:cTn id="9" presetID="1" presetClass="entr" presetSubtype="0" fill="hold" grpId="0" nodeType="withEffect">
+                                  <p:stCondLst>
+                                    <p:cond delay="0"/>
+                                  </p:stCondLst>
+                                  <p:childTnLst>
+                                    <p:set>
+                                      <p:cBhvr>
+                                        <p:cTn id="10" dur="1" fill="hold">
+                                          <p:stCondLst>
+                                            <p:cond delay="0"/>
+                                          </p:stCondLst>
+                                        </p:cTn>
+                                        <p:tgtEl>
+                                          <p:spTgt spid="32"/>
+                                        </p:tgtEl>
+                                        <p:attrNameLst>
+                                          <p:attrName>style.visibility</p:attrName>
+                                        </p:attrNameLst>
+                                      </p:cBhvr>
+                                      <p:to>
+                                        <p:strVal val="visible"/>
+                                      </p:to>
+                                    </p:set>
+                                  </p:childTnLst>
+                                </p:cTn>
+                              </p:par>
+                              <p:par>
+                                <p:cTn id="11" presetID="1" presetClass="entr" presetSubtype="0" fill="hold" grpId="0" nodeType="withEffect">
+                                  <p:stCondLst>
+                                    <p:cond delay="0"/>
+                                  </p:stCondLst>
+                                  <p:childTnLst>
+                                    <p:set>
+                                      <p:cBhvr>
+                                        <p:cTn id="12" dur="1" fill="hold">
+                                          <p:stCondLst>
+                                            <p:cond delay="0"/>
+                                          </p:stCondLst>
+                                        </p:cTn>
+                                        <p:tgtEl>
+                                          <p:spTgt spid="31"/>
+                                        </p:tgtEl>
+                                        <p:attrNameLst>
+                                          <p:attrName>style.visibility</p:attrName>
+                                        </p:attrNameLst>
+                                      </p:cBhvr>
+                                      <p:to>
+                                        <p:strVal val="visible"/>
+                                      </p:to>
+                                    </p:set>
+                                  </p:childTnLst>
+                                </p:cTn>
+                              </p:par>
+                              <p:par>
+                                <p:cTn id="13" presetID="10" presetClass="entr" presetSubtype="0" fill="hold" nodeType="withEffect">
+                                  <p:stCondLst>
+                                    <p:cond delay="0"/>
+                                  </p:stCondLst>
+                                  <p:childTnLst>
+                                    <p:set>
+                                      <p:cBhvr>
+                                        <p:cTn id="14" dur="1" fill="hold">
+                                          <p:stCondLst>
+                                            <p:cond delay="0"/>
+                                          </p:stCondLst>
+                                        </p:cTn>
+                                        <p:tgtEl>
+                                          <p:spTgt spid="3"/>
+                                        </p:tgtEl>
+                                        <p:attrNameLst>
+                                          <p:attrName>style.visibility</p:attrName>
+                                        </p:attrNameLst>
+                                      </p:cBhvr>
+                                      <p:to>
+                                        <p:strVal val="visible"/>
+                                      </p:to>
+                                    </p:set>
+                                    <p:animEffect transition="in" filter="fade">
+                                      <p:cBhvr>
+                                        <p:cTn id="15" dur="500"/>
+                                        <p:tgtEl>
+                                          <p:spTgt spid="3"/>
+                                        </p:tgtEl>
+                                      </p:cBhvr>
+                                    </p:animEffect>
+                                  </p:childTnLst>
+                                </p:cTn>
+                              </p:par>
+                              <p:par>
+                                <p:cTn id="16" presetID="10" presetClass="entr" presetSubtype="0" fill="hold" grpId="0" nodeType="withEffect">
+                                  <p:stCondLst>
+                                    <p:cond delay="0"/>
+                                  </p:stCondLst>
+                                  <p:childTnLst>
+                                    <p:set>
+                                      <p:cBhvr>
+                                        <p:cTn id="17" dur="1" fill="hold">
+                                          <p:stCondLst>
+                                            <p:cond delay="0"/>
+                                          </p:stCondLst>
+                                        </p:cTn>
+                                        <p:tgtEl>
+                                          <p:spTgt spid="2"/>
+                                        </p:tgtEl>
+                                        <p:attrNameLst>
+                                          <p:attrName>style.visibility</p:attrName>
+                                        </p:attrNameLst>
+                                      </p:cBhvr>
+                                      <p:to>
+                                        <p:strVal val="visible"/>
+                                      </p:to>
+                                    </p:set>
+                                    <p:animEffect transition="in" filter="fade">
+                                      <p:cBhvr>
+                                        <p:cTn id="18" dur="500"/>
+                                        <p:tgtEl>
+                                          <p:spTgt spid="2"/>
+                                        </p:tgtEl>
+                                      </p:cBhvr>
+                                    </p:animEffect>
+                                  </p:childTnLst>
+                                </p:cTn>
+                              </p:par>
+                            </p:childTnLst>
+                          </p:cTn>
+                        </p:par>
+                      </p:childTnLst>
+                    </p:cTn>
+                  </p:par>
+                </p:childTnLst>
+              </p:cTn>
+              <p:prevCondLst>
+                <p:cond evt="onPrev" delay="0">
+                  <p:tgtEl>
+                    <p:sldTgt/>
+                  </p:tgtEl>
+                </p:cond>
+              </p:prevCondLst>
+              <p:nextCondLst>
+                <p:cond evt="onNext" delay="0">
+                  <p:tgtEl>
+                    <p:sldTgt/>
+                  </p:tgtEl>
+                </p:cond>
+              </p:nextCondLst>
+            </p:seq>
+          </p:childTnLst>
+        </p:cTn>
+      </p:par>
+    </p:tnLst>
+    <p:bldLst>
+      <p:bldP spid="25" grpId="0" animBg="1"/>
+      <p:bldP spid="30" grpId="0" animBg="1"/>
+      <p:bldP spid="31" grpId="0" animBg="1"/>
+      <p:bldP spid="32" grpId="0" animBg="1"/>
+      <p:bldP spid="2" grpId="0"/>
+    </p:bldLst>
+  </p:timing>
+</p:sld>
+</file>
+
+<file path=ppt/slides/slide15.xml><?xml version="1.0" encoding="utf-8"?>
+<p:sld xmlns:a="http://schemas.openxmlformats.org/drawingml/2006/main" xmlns:r="http://schemas.openxmlformats.org/officeDocument/2006/relationships" xmlns:p="http://schemas.openxmlformats.org/presentationml/2006/main">
+  <p:cSld>
+    <p:spTree>
+      <p:nvGrpSpPr>
+        <p:cNvPr id="1" name=""/>
+        <p:cNvGrpSpPr/>
+        <p:nvPr/>
+      </p:nvGrpSpPr>
+      <p:grpSpPr>
+        <a:xfrm>
+          <a:off x="0" y="0"/>
+          <a:ext cx="0" cy="0"/>
+          <a:chOff x="0" y="0"/>
+          <a:chExt cx="0" cy="0"/>
+        </a:xfrm>
+      </p:grpSpPr>
       <p:sp>
         <p:nvSpPr>
           <p:cNvPr id="2" name="Title 1">
@@ -13969,7 +14704,7 @@
 </p:sld>
 </file>
 
-<file path=ppt/slides/slide15.xml><?xml version="1.0" encoding="utf-8"?>
+<file path=ppt/slides/slide16.xml><?xml version="1.0" encoding="utf-8"?>
 <p:sld xmlns:a="http://schemas.openxmlformats.org/drawingml/2006/main" xmlns:r="http://schemas.openxmlformats.org/officeDocument/2006/relationships" xmlns:p="http://schemas.openxmlformats.org/presentationml/2006/main">
   <p:cSld>
     <p:bg>
@@ -14173,7 +14908,7 @@
 </p:sld>
 </file>
 
-<file path=ppt/slides/slide16.xml><?xml version="1.0" encoding="utf-8"?>
+<file path=ppt/slides/slide17.xml><?xml version="1.0" encoding="utf-8"?>
 <p:sld xmlns:a="http://schemas.openxmlformats.org/drawingml/2006/main" xmlns:r="http://schemas.openxmlformats.org/officeDocument/2006/relationships" xmlns:p="http://schemas.openxmlformats.org/presentationml/2006/main">
   <p:cSld>
     <p:bg>
@@ -14377,7 +15112,7 @@
 </p:sld>
 </file>
 
-<file path=ppt/slides/slide17.xml><?xml version="1.0" encoding="utf-8"?>
+<file path=ppt/slides/slide18.xml><?xml version="1.0" encoding="utf-8"?>
 <p:sld xmlns:a="http://schemas.openxmlformats.org/drawingml/2006/main" xmlns:r="http://schemas.openxmlformats.org/officeDocument/2006/relationships" xmlns:p="http://schemas.openxmlformats.org/presentationml/2006/main">
   <p:cSld>
     <p:bg>
@@ -14586,7 +15321,7 @@
 </p:sld>
 </file>
 
-<file path=ppt/slides/slide18.xml><?xml version="1.0" encoding="utf-8"?>
+<file path=ppt/slides/slide19.xml><?xml version="1.0" encoding="utf-8"?>
 <p:sld xmlns:a="http://schemas.openxmlformats.org/drawingml/2006/main" xmlns:r="http://schemas.openxmlformats.org/officeDocument/2006/relationships" xmlns:p="http://schemas.openxmlformats.org/presentationml/2006/main">
   <p:cSld>
     <p:bg>
@@ -14781,65 +15516,6 @@
     <p:extLst>
       <p:ext uri="{BB962C8B-B14F-4D97-AF65-F5344CB8AC3E}">
         <p14:creationId xmlns:p14="http://schemas.microsoft.com/office/powerpoint/2010/main" val="982843329"/>
-      </p:ext>
-    </p:extLst>
-  </p:cSld>
-  <p:clrMapOvr>
-    <a:masterClrMapping/>
-  </p:clrMapOvr>
-</p:sld>
-</file>
-
-<file path=ppt/slides/slide19.xml><?xml version="1.0" encoding="utf-8"?>
-<p:sld xmlns:a="http://schemas.openxmlformats.org/drawingml/2006/main" xmlns:r="http://schemas.openxmlformats.org/officeDocument/2006/relationships" xmlns:p="http://schemas.openxmlformats.org/presentationml/2006/main">
-  <p:cSld>
-    <p:spTree>
-      <p:nvGrpSpPr>
-        <p:cNvPr id="1" name=""/>
-        <p:cNvGrpSpPr/>
-        <p:nvPr/>
-      </p:nvGrpSpPr>
-      <p:grpSpPr>
-        <a:xfrm>
-          <a:off x="0" y="0"/>
-          <a:ext cx="0" cy="0"/>
-          <a:chOff x="0" y="0"/>
-          <a:chExt cx="0" cy="0"/>
-        </a:xfrm>
-      </p:grpSpPr>
-      <p:pic>
-        <p:nvPicPr>
-          <p:cNvPr id="5" name="Content Placeholder 4">
-            <a:extLst>
-              <a:ext uri="{FF2B5EF4-FFF2-40B4-BE49-F238E27FC236}">
-                <a16:creationId xmlns:a16="http://schemas.microsoft.com/office/drawing/2014/main" id="{DEDF5831-6B67-4F44-8EBE-5419D55C3CC7}"/>
-              </a:ext>
-            </a:extLst>
-          </p:cNvPr>
-          <p:cNvPicPr>
-            <a:picLocks noGrp="1" noChangeAspect="1"/>
-          </p:cNvPicPr>
-          <p:nvPr>
-            <p:ph idx="1"/>
-          </p:nvPr>
-        </p:nvPicPr>
-        <p:blipFill>
-          <a:blip r:embed="rId3"/>
-          <a:stretch>
-            <a:fillRect/>
-          </a:stretch>
-        </p:blipFill>
-        <p:spPr>
-          <a:xfrm>
-            <a:off x="2781300" y="0"/>
-            <a:ext cx="6791157" cy="6230214"/>
-          </a:xfrm>
-        </p:spPr>
-      </p:pic>
-    </p:spTree>
-    <p:extLst>
-      <p:ext uri="{BB962C8B-B14F-4D97-AF65-F5344CB8AC3E}">
-        <p14:creationId xmlns:p14="http://schemas.microsoft.com/office/powerpoint/2010/main" val="3399314594"/>
       </p:ext>
     </p:extLst>
   </p:cSld>
@@ -14934,6 +15610,65 @@
           <a:chExt cx="0" cy="0"/>
         </a:xfrm>
       </p:grpSpPr>
+      <p:pic>
+        <p:nvPicPr>
+          <p:cNvPr id="5" name="Content Placeholder 4">
+            <a:extLst>
+              <a:ext uri="{FF2B5EF4-FFF2-40B4-BE49-F238E27FC236}">
+                <a16:creationId xmlns:a16="http://schemas.microsoft.com/office/drawing/2014/main" id="{DEDF5831-6B67-4F44-8EBE-5419D55C3CC7}"/>
+              </a:ext>
+            </a:extLst>
+          </p:cNvPr>
+          <p:cNvPicPr>
+            <a:picLocks noGrp="1" noChangeAspect="1"/>
+          </p:cNvPicPr>
+          <p:nvPr>
+            <p:ph idx="1"/>
+          </p:nvPr>
+        </p:nvPicPr>
+        <p:blipFill>
+          <a:blip r:embed="rId3"/>
+          <a:stretch>
+            <a:fillRect/>
+          </a:stretch>
+        </p:blipFill>
+        <p:spPr>
+          <a:xfrm>
+            <a:off x="2781300" y="0"/>
+            <a:ext cx="6791157" cy="6230214"/>
+          </a:xfrm>
+        </p:spPr>
+      </p:pic>
+    </p:spTree>
+    <p:extLst>
+      <p:ext uri="{BB962C8B-B14F-4D97-AF65-F5344CB8AC3E}">
+        <p14:creationId xmlns:p14="http://schemas.microsoft.com/office/powerpoint/2010/main" val="3399314594"/>
+      </p:ext>
+    </p:extLst>
+  </p:cSld>
+  <p:clrMapOvr>
+    <a:masterClrMapping/>
+  </p:clrMapOvr>
+</p:sld>
+</file>
+
+<file path=ppt/slides/slide21.xml><?xml version="1.0" encoding="utf-8"?>
+<p:sld xmlns:a="http://schemas.openxmlformats.org/drawingml/2006/main" xmlns:r="http://schemas.openxmlformats.org/officeDocument/2006/relationships" xmlns:p="http://schemas.openxmlformats.org/presentationml/2006/main">
+  <p:cSld>
+    <p:spTree>
+      <p:nvGrpSpPr>
+        <p:cNvPr id="1" name=""/>
+        <p:cNvGrpSpPr/>
+        <p:nvPr/>
+      </p:nvGrpSpPr>
+      <p:grpSpPr>
+        <a:xfrm>
+          <a:off x="0" y="0"/>
+          <a:ext cx="0" cy="0"/>
+          <a:chOff x="0" y="0"/>
+          <a:chExt cx="0" cy="0"/>
+        </a:xfrm>
+      </p:grpSpPr>
       <p:graphicFrame>
         <p:nvGraphicFramePr>
           <p:cNvPr id="5" name="Content Placeholder 4">
@@ -14973,7 +15708,7 @@
 </p:sld>
 </file>
 
-<file path=ppt/slides/slide21.xml><?xml version="1.0" encoding="utf-8"?>
+<file path=ppt/slides/slide22.xml><?xml version="1.0" encoding="utf-8"?>
 <p:sld xmlns:a="http://schemas.openxmlformats.org/drawingml/2006/main" xmlns:r="http://schemas.openxmlformats.org/officeDocument/2006/relationships" xmlns:p="http://schemas.openxmlformats.org/presentationml/2006/main">
   <p:cSld>
     <p:bg>
@@ -15179,7 +15914,255 @@
 </p:sld>
 </file>
 
-<file path=ppt/slides/slide22.xml><?xml version="1.0" encoding="utf-8"?>
+<file path=ppt/slides/slide23.xml><?xml version="1.0" encoding="utf-8"?>
+<p:sld xmlns:a="http://schemas.openxmlformats.org/drawingml/2006/main" xmlns:r="http://schemas.openxmlformats.org/officeDocument/2006/relationships" xmlns:p="http://schemas.openxmlformats.org/presentationml/2006/main">
+  <p:cSld>
+    <p:bg>
+      <p:bgPr>
+        <a:solidFill>
+          <a:srgbClr val="1E1E1E"/>
+        </a:solidFill>
+        <a:effectLst/>
+      </p:bgPr>
+    </p:bg>
+    <p:spTree>
+      <p:nvGrpSpPr>
+        <p:cNvPr id="1" name=""/>
+        <p:cNvGrpSpPr/>
+        <p:nvPr/>
+      </p:nvGrpSpPr>
+      <p:grpSpPr>
+        <a:xfrm>
+          <a:off x="0" y="0"/>
+          <a:ext cx="0" cy="0"/>
+          <a:chOff x="0" y="0"/>
+          <a:chExt cx="0" cy="0"/>
+        </a:xfrm>
+      </p:grpSpPr>
+      <p:sp>
+        <p:nvSpPr>
+          <p:cNvPr id="11" name="Rectangle 10">
+            <a:extLst>
+              <a:ext uri="{FF2B5EF4-FFF2-40B4-BE49-F238E27FC236}">
+                <a16:creationId xmlns:a16="http://schemas.microsoft.com/office/drawing/2014/main" id="{9B4CD2ED-9C8D-4DC4-92DF-F24AA131E440}"/>
+              </a:ext>
+            </a:extLst>
+          </p:cNvPr>
+          <p:cNvSpPr/>
+          <p:nvPr/>
+        </p:nvSpPr>
+        <p:spPr>
+          <a:xfrm>
+            <a:off x="1668780" y="4358640"/>
+            <a:ext cx="8778240" cy="2057400"/>
+          </a:xfrm>
+          <a:prstGeom prst="rect">
+            <a:avLst/>
+          </a:prstGeom>
+          <a:solidFill>
+            <a:srgbClr val="1E1E1E"/>
+          </a:solidFill>
+          <a:ln>
+            <a:noFill/>
+          </a:ln>
+        </p:spPr>
+        <p:style>
+          <a:lnRef idx="2">
+            <a:schemeClr val="accent1">
+              <a:shade val="50000"/>
+            </a:schemeClr>
+          </a:lnRef>
+          <a:fillRef idx="1">
+            <a:schemeClr val="accent1"/>
+          </a:fillRef>
+          <a:effectRef idx="0">
+            <a:schemeClr val="accent1"/>
+          </a:effectRef>
+          <a:fontRef idx="minor">
+            <a:schemeClr val="lt1"/>
+          </a:fontRef>
+        </p:style>
+        <p:txBody>
+          <a:bodyPr rtlCol="0" anchor="ctr"/>
+          <a:lstStyle/>
+          <a:p>
+            <a:pPr algn="ctr"/>
+            <a:endParaRPr lang="en-US"/>
+          </a:p>
+        </p:txBody>
+      </p:sp>
+      <p:pic>
+        <p:nvPicPr>
+          <p:cNvPr id="5" name="Picture 4">
+            <a:extLst>
+              <a:ext uri="{FF2B5EF4-FFF2-40B4-BE49-F238E27FC236}">
+                <a16:creationId xmlns:a16="http://schemas.microsoft.com/office/drawing/2014/main" id="{8A5F0439-9CA6-4CF8-BE7A-AB7465A148CD}"/>
+              </a:ext>
+            </a:extLst>
+          </p:cNvPr>
+          <p:cNvPicPr>
+            <a:picLocks noChangeAspect="1"/>
+          </p:cNvPicPr>
+          <p:nvPr/>
+        </p:nvPicPr>
+        <p:blipFill>
+          <a:blip r:embed="rId3"/>
+          <a:stretch>
+            <a:fillRect/>
+          </a:stretch>
+        </p:blipFill>
+        <p:spPr>
+          <a:xfrm>
+            <a:off x="3117918" y="1475741"/>
+            <a:ext cx="5334471" cy="4940299"/>
+          </a:xfrm>
+          <a:prstGeom prst="rect">
+            <a:avLst/>
+          </a:prstGeom>
+        </p:spPr>
+      </p:pic>
+      <p:sp>
+        <p:nvSpPr>
+          <p:cNvPr id="8" name="Content Placeholder 2">
+            <a:extLst>
+              <a:ext uri="{FF2B5EF4-FFF2-40B4-BE49-F238E27FC236}">
+                <a16:creationId xmlns:a16="http://schemas.microsoft.com/office/drawing/2014/main" id="{6F3A3910-101C-4480-A831-3A5D3D58997E}"/>
+              </a:ext>
+            </a:extLst>
+          </p:cNvPr>
+          <p:cNvSpPr>
+            <a:spLocks noGrp="1"/>
+          </p:cNvSpPr>
+          <p:nvPr>
+            <p:ph idx="1"/>
+          </p:nvPr>
+        </p:nvSpPr>
+        <p:spPr>
+          <a:xfrm>
+            <a:off x="711200" y="489971"/>
+            <a:ext cx="10538488" cy="621279"/>
+          </a:xfrm>
+        </p:spPr>
+        <p:txBody>
+          <a:bodyPr>
+            <a:normAutofit/>
+          </a:bodyPr>
+          <a:lstStyle/>
+          <a:p>
+            <a:pPr marL="0" indent="0">
+              <a:buNone/>
+            </a:pPr>
+            <a:r>
+              <a:rPr lang="en-US" sz="3600" dirty="0">
+                <a:solidFill>
+                  <a:schemeClr val="bg1"/>
+                </a:solidFill>
+              </a:rPr>
+              <a:t>Why immutable?</a:t>
+            </a:r>
+          </a:p>
+        </p:txBody>
+      </p:sp>
+    </p:spTree>
+    <p:extLst>
+      <p:ext uri="{BB962C8B-B14F-4D97-AF65-F5344CB8AC3E}">
+        <p14:creationId xmlns:p14="http://schemas.microsoft.com/office/powerpoint/2010/main" val="3212872626"/>
+      </p:ext>
+    </p:extLst>
+  </p:cSld>
+  <p:clrMapOvr>
+    <a:masterClrMapping/>
+  </p:clrMapOvr>
+  <p:timing>
+    <p:tnLst>
+      <p:par>
+        <p:cTn id="1" dur="indefinite" restart="never" nodeType="tmRoot">
+          <p:childTnLst>
+            <p:seq concurrent="1" nextAc="seek">
+              <p:cTn id="2" dur="indefinite" nodeType="mainSeq">
+                <p:childTnLst>
+                  <p:par>
+                    <p:cTn id="3" fill="hold">
+                      <p:stCondLst>
+                        <p:cond delay="indefinite"/>
+                      </p:stCondLst>
+                      <p:childTnLst>
+                        <p:par>
+                          <p:cTn id="4" fill="hold">
+                            <p:stCondLst>
+                              <p:cond delay="0"/>
+                            </p:stCondLst>
+                            <p:childTnLst>
+                              <p:par>
+                                <p:cTn id="5" presetID="10" presetClass="exit" presetSubtype="0" fill="hold" grpId="0" nodeType="clickEffect">
+                                  <p:stCondLst>
+                                    <p:cond delay="0"/>
+                                  </p:stCondLst>
+                                  <p:childTnLst>
+                                    <p:animEffect transition="out" filter="fade">
+                                      <p:cBhvr>
+                                        <p:cTn id="6" dur="500"/>
+                                        <p:tgtEl>
+                                          <p:spTgt spid="11"/>
+                                        </p:tgtEl>
+                                      </p:cBhvr>
+                                    </p:animEffect>
+                                    <p:set>
+                                      <p:cBhvr>
+                                        <p:cTn id="7" dur="1" fill="hold">
+                                          <p:stCondLst>
+                                            <p:cond delay="499"/>
+                                          </p:stCondLst>
+                                        </p:cTn>
+                                        <p:tgtEl>
+                                          <p:spTgt spid="11"/>
+                                        </p:tgtEl>
+                                        <p:attrNameLst>
+                                          <p:attrName>style.visibility</p:attrName>
+                                        </p:attrNameLst>
+                                      </p:cBhvr>
+                                      <p:to>
+                                        <p:strVal val="hidden"/>
+                                      </p:to>
+                                    </p:set>
+                                  </p:childTnLst>
+                                </p:cTn>
+                              </p:par>
+                            </p:childTnLst>
+                          </p:cTn>
+                        </p:par>
+                      </p:childTnLst>
+                    </p:cTn>
+                  </p:par>
+                </p:childTnLst>
+              </p:cTn>
+              <p:prevCondLst>
+                <p:cond evt="onPrev" delay="0">
+                  <p:tgtEl>
+                    <p:sldTgt/>
+                  </p:tgtEl>
+                </p:cond>
+              </p:prevCondLst>
+              <p:nextCondLst>
+                <p:cond evt="onNext" delay="0">
+                  <p:tgtEl>
+                    <p:sldTgt/>
+                  </p:tgtEl>
+                </p:cond>
+              </p:nextCondLst>
+            </p:seq>
+          </p:childTnLst>
+        </p:cTn>
+      </p:par>
+    </p:tnLst>
+    <p:bldLst>
+      <p:bldP spid="11" grpId="0" animBg="1"/>
+    </p:bldLst>
+  </p:timing>
+</p:sld>
+</file>
+
+<file path=ppt/slides/slide24.xml><?xml version="1.0" encoding="utf-8"?>
 <p:sld xmlns:a="http://schemas.openxmlformats.org/drawingml/2006/main" xmlns:r="http://schemas.openxmlformats.org/officeDocument/2006/relationships" xmlns:p="http://schemas.openxmlformats.org/presentationml/2006/main">
   <p:cSld>
     <p:spTree>
@@ -15262,7 +16245,7 @@
 </p:sld>
 </file>
 
-<file path=ppt/slides/slide23.xml><?xml version="1.0" encoding="utf-8"?>
+<file path=ppt/slides/slide25.xml><?xml version="1.0" encoding="utf-8"?>
 <p:sld xmlns:a="http://schemas.openxmlformats.org/drawingml/2006/main" xmlns:r="http://schemas.openxmlformats.org/officeDocument/2006/relationships" xmlns:p="http://schemas.openxmlformats.org/presentationml/2006/main">
   <p:cSld>
     <p:spTree>
@@ -15320,7 +16303,7 @@
 </p:sld>
 </file>
 
-<file path=ppt/slides/slide24.xml><?xml version="1.0" encoding="utf-8"?>
+<file path=ppt/slides/slide26.xml><?xml version="1.0" encoding="utf-8"?>
 <p:sld xmlns:a="http://schemas.openxmlformats.org/drawingml/2006/main" xmlns:r="http://schemas.openxmlformats.org/officeDocument/2006/relationships" xmlns:p="http://schemas.openxmlformats.org/presentationml/2006/main">
   <p:cSld>
     <p:bg>
@@ -15585,7 +16568,7 @@
 </p:sld>
 </file>
 
-<file path=ppt/slides/slide25.xml><?xml version="1.0" encoding="utf-8"?>
+<file path=ppt/slides/slide27.xml><?xml version="1.0" encoding="utf-8"?>
 <p:sld xmlns:a="http://schemas.openxmlformats.org/drawingml/2006/main" xmlns:r="http://schemas.openxmlformats.org/officeDocument/2006/relationships" xmlns:p="http://schemas.openxmlformats.org/presentationml/2006/main">
   <p:cSld>
     <p:bg>
@@ -16052,7 +17035,7 @@
 </p:sld>
 </file>
 
-<file path=ppt/slides/slide26.xml><?xml version="1.0" encoding="utf-8"?>
+<file path=ppt/slides/slide28.xml><?xml version="1.0" encoding="utf-8"?>
 <p:sld xmlns:a="http://schemas.openxmlformats.org/drawingml/2006/main" xmlns:r="http://schemas.openxmlformats.org/officeDocument/2006/relationships" xmlns:p="http://schemas.openxmlformats.org/presentationml/2006/main">
   <p:cSld>
     <p:spTree>
@@ -16232,7 +17215,7 @@
 </p:sld>
 </file>
 
-<file path=ppt/slides/slide27.xml><?xml version="1.0" encoding="utf-8"?>
+<file path=ppt/slides/slide29.xml><?xml version="1.0" encoding="utf-8"?>
 <p:sld xmlns:a="http://schemas.openxmlformats.org/drawingml/2006/main" xmlns:r="http://schemas.openxmlformats.org/officeDocument/2006/relationships" xmlns:p="http://schemas.openxmlformats.org/presentationml/2006/main">
   <p:cSld>
     <p:bg>
@@ -16418,247 +17401,6 @@
     <p:extLst>
       <p:ext uri="{BB962C8B-B14F-4D97-AF65-F5344CB8AC3E}">
         <p14:creationId xmlns:p14="http://schemas.microsoft.com/office/powerpoint/2010/main" val="151847475"/>
-      </p:ext>
-    </p:extLst>
-  </p:cSld>
-  <p:clrMapOvr>
-    <a:masterClrMapping/>
-  </p:clrMapOvr>
-</p:sld>
-</file>
-
-<file path=ppt/slides/slide28.xml><?xml version="1.0" encoding="utf-8"?>
-<p:sld xmlns:a="http://schemas.openxmlformats.org/drawingml/2006/main" xmlns:r="http://schemas.openxmlformats.org/officeDocument/2006/relationships" xmlns:p="http://schemas.openxmlformats.org/presentationml/2006/main">
-  <p:cSld>
-    <p:bg>
-      <p:bgPr>
-        <a:solidFill>
-          <a:srgbClr val="1E1E1E"/>
-        </a:solidFill>
-        <a:effectLst/>
-      </p:bgPr>
-    </p:bg>
-    <p:spTree>
-      <p:nvGrpSpPr>
-        <p:cNvPr id="1" name=""/>
-        <p:cNvGrpSpPr/>
-        <p:nvPr/>
-      </p:nvGrpSpPr>
-      <p:grpSpPr>
-        <a:xfrm>
-          <a:off x="0" y="0"/>
-          <a:ext cx="0" cy="0"/>
-          <a:chOff x="0" y="0"/>
-          <a:chExt cx="0" cy="0"/>
-        </a:xfrm>
-      </p:grpSpPr>
-      <p:pic>
-        <p:nvPicPr>
-          <p:cNvPr id="7" name="Picture 6">
-            <a:extLst>
-              <a:ext uri="{FF2B5EF4-FFF2-40B4-BE49-F238E27FC236}">
-                <a16:creationId xmlns:a16="http://schemas.microsoft.com/office/drawing/2014/main" id="{D0E7446D-B25D-4CC3-B0BD-7351546968A0}"/>
-              </a:ext>
-            </a:extLst>
-          </p:cNvPr>
-          <p:cNvPicPr>
-            <a:picLocks noChangeAspect="1"/>
-          </p:cNvPicPr>
-          <p:nvPr/>
-        </p:nvPicPr>
-        <p:blipFill>
-          <a:blip r:embed="rId3"/>
-          <a:stretch>
-            <a:fillRect/>
-          </a:stretch>
-        </p:blipFill>
-        <p:spPr>
-          <a:xfrm>
-            <a:off x="2800350" y="217859"/>
-            <a:ext cx="6457936" cy="6422282"/>
-          </a:xfrm>
-          <a:prstGeom prst="rect">
-            <a:avLst/>
-          </a:prstGeom>
-        </p:spPr>
-      </p:pic>
-    </p:spTree>
-    <p:extLst>
-      <p:ext uri="{BB962C8B-B14F-4D97-AF65-F5344CB8AC3E}">
-        <p14:creationId xmlns:p14="http://schemas.microsoft.com/office/powerpoint/2010/main" val="3363355965"/>
-      </p:ext>
-    </p:extLst>
-  </p:cSld>
-  <p:clrMapOvr>
-    <a:masterClrMapping/>
-  </p:clrMapOvr>
-</p:sld>
-</file>
-
-<file path=ppt/slides/slide29.xml><?xml version="1.0" encoding="utf-8"?>
-<p:sld xmlns:a="http://schemas.openxmlformats.org/drawingml/2006/main" xmlns:r="http://schemas.openxmlformats.org/officeDocument/2006/relationships" xmlns:p="http://schemas.openxmlformats.org/presentationml/2006/main">
-  <p:cSld>
-    <p:spTree>
-      <p:nvGrpSpPr>
-        <p:cNvPr id="1" name=""/>
-        <p:cNvGrpSpPr/>
-        <p:nvPr/>
-      </p:nvGrpSpPr>
-      <p:grpSpPr>
-        <a:xfrm>
-          <a:off x="0" y="0"/>
-          <a:ext cx="0" cy="0"/>
-          <a:chOff x="0" y="0"/>
-          <a:chExt cx="0" cy="0"/>
-        </a:xfrm>
-      </p:grpSpPr>
-      <p:sp>
-        <p:nvSpPr>
-          <p:cNvPr id="2" name="Title 1">
-            <a:extLst>
-              <a:ext uri="{FF2B5EF4-FFF2-40B4-BE49-F238E27FC236}">
-                <a16:creationId xmlns:a16="http://schemas.microsoft.com/office/drawing/2014/main" id="{B1DE69EC-C59D-4688-95A0-A713D9F9FFF5}"/>
-              </a:ext>
-            </a:extLst>
-          </p:cNvPr>
-          <p:cNvSpPr>
-            <a:spLocks noGrp="1"/>
-          </p:cNvSpPr>
-          <p:nvPr>
-            <p:ph type="title"/>
-          </p:nvPr>
-        </p:nvSpPr>
-        <p:spPr/>
-        <p:txBody>
-          <a:bodyPr/>
-          <a:lstStyle/>
-          <a:p>
-            <a:r>
-              <a:rPr lang="en-US" dirty="0"/>
-              <a:t>When to use Redux</a:t>
-            </a:r>
-          </a:p>
-        </p:txBody>
-      </p:sp>
-      <p:sp>
-        <p:nvSpPr>
-          <p:cNvPr id="3" name="Content Placeholder 2">
-            <a:extLst>
-              <a:ext uri="{FF2B5EF4-FFF2-40B4-BE49-F238E27FC236}">
-                <a16:creationId xmlns:a16="http://schemas.microsoft.com/office/drawing/2014/main" id="{BD8F6A13-1666-457D-A85D-96076164CB70}"/>
-              </a:ext>
-            </a:extLst>
-          </p:cNvPr>
-          <p:cNvSpPr>
-            <a:spLocks noGrp="1"/>
-          </p:cNvSpPr>
-          <p:nvPr>
-            <p:ph idx="1"/>
-          </p:nvPr>
-        </p:nvSpPr>
-        <p:spPr/>
-        <p:txBody>
-          <a:bodyPr/>
-          <a:lstStyle/>
-          <a:p>
-            <a:pPr algn="l">
-              <a:buFont typeface="Arial" panose="020B0604020202020204" pitchFamily="34" charset="0"/>
-              <a:buChar char="•"/>
-            </a:pPr>
-            <a:r>
-              <a:rPr lang="en-US" b="0" i="0" dirty="0">
-                <a:solidFill>
-                  <a:srgbClr val="1C1E21"/>
-                </a:solidFill>
-                <a:effectLst/>
-                <a:latin typeface="system-ui"/>
-              </a:rPr>
-              <a:t>You have reasonable amounts of data changing over time</a:t>
-            </a:r>
-          </a:p>
-          <a:p>
-            <a:pPr algn="l">
-              <a:buFont typeface="Arial" panose="020B0604020202020204" pitchFamily="34" charset="0"/>
-              <a:buChar char="•"/>
-            </a:pPr>
-            <a:r>
-              <a:rPr lang="en-US" b="0" i="0" dirty="0">
-                <a:solidFill>
-                  <a:srgbClr val="1C1E21"/>
-                </a:solidFill>
-                <a:effectLst/>
-                <a:latin typeface="system-ui"/>
-              </a:rPr>
-              <a:t>You need a single source of truth for your state</a:t>
-            </a:r>
-          </a:p>
-          <a:p>
-            <a:pPr algn="l">
-              <a:buFont typeface="Arial" panose="020B0604020202020204" pitchFamily="34" charset="0"/>
-              <a:buChar char="•"/>
-            </a:pPr>
-            <a:r>
-              <a:rPr lang="en-US" b="0" i="0" dirty="0">
-                <a:solidFill>
-                  <a:srgbClr val="1C1E21"/>
-                </a:solidFill>
-                <a:effectLst/>
-                <a:latin typeface="system-ui"/>
-              </a:rPr>
-              <a:t>Keeping all your state in a top-level component is no longer sufficient.</a:t>
-            </a:r>
-          </a:p>
-          <a:p>
-            <a:pPr algn="l">
-              <a:buFont typeface="Arial" panose="020B0604020202020204" pitchFamily="34" charset="0"/>
-              <a:buChar char="•"/>
-            </a:pPr>
-            <a:endParaRPr lang="en-US" b="0" i="0" dirty="0">
-              <a:solidFill>
-                <a:srgbClr val="1C1E21"/>
-              </a:solidFill>
-              <a:effectLst/>
-              <a:latin typeface="system-ui"/>
-            </a:endParaRPr>
-          </a:p>
-          <a:p>
-            <a:pPr algn="l">
-              <a:buFont typeface="Arial" panose="020B0604020202020204" pitchFamily="34" charset="0"/>
-              <a:buChar char="•"/>
-            </a:pPr>
-            <a:r>
-              <a:rPr lang="en-US" b="1" i="0" dirty="0">
-                <a:solidFill>
-                  <a:srgbClr val="1C1E21"/>
-                </a:solidFill>
-                <a:effectLst/>
-                <a:latin typeface="system-ui"/>
-              </a:rPr>
-              <a:t>Global state that is needed across the app should go in the Redux store. </a:t>
-            </a:r>
-          </a:p>
-          <a:p>
-            <a:pPr lvl="1"/>
-            <a:r>
-              <a:rPr lang="en-US" i="0" dirty="0">
-                <a:solidFill>
-                  <a:srgbClr val="1C1E21"/>
-                </a:solidFill>
-                <a:effectLst/>
-                <a:latin typeface="system-ui"/>
-              </a:rPr>
-              <a:t>State only relevant to a single component can still be kept in component state.</a:t>
-            </a:r>
-          </a:p>
-          <a:p>
-            <a:endParaRPr lang="en-US" dirty="0"/>
-          </a:p>
-        </p:txBody>
-      </p:sp>
-    </p:spTree>
-    <p:extLst>
-      <p:ext uri="{BB962C8B-B14F-4D97-AF65-F5344CB8AC3E}">
-        <p14:creationId xmlns:p14="http://schemas.microsoft.com/office/powerpoint/2010/main" val="2503902979"/>
       </p:ext>
     </p:extLst>
   </p:cSld>
@@ -16730,6 +17472,247 @@
 </file>
 
 <file path=ppt/slides/slide30.xml><?xml version="1.0" encoding="utf-8"?>
+<p:sld xmlns:a="http://schemas.openxmlformats.org/drawingml/2006/main" xmlns:r="http://schemas.openxmlformats.org/officeDocument/2006/relationships" xmlns:p="http://schemas.openxmlformats.org/presentationml/2006/main">
+  <p:cSld>
+    <p:bg>
+      <p:bgPr>
+        <a:solidFill>
+          <a:srgbClr val="1E1E1E"/>
+        </a:solidFill>
+        <a:effectLst/>
+      </p:bgPr>
+    </p:bg>
+    <p:spTree>
+      <p:nvGrpSpPr>
+        <p:cNvPr id="1" name=""/>
+        <p:cNvGrpSpPr/>
+        <p:nvPr/>
+      </p:nvGrpSpPr>
+      <p:grpSpPr>
+        <a:xfrm>
+          <a:off x="0" y="0"/>
+          <a:ext cx="0" cy="0"/>
+          <a:chOff x="0" y="0"/>
+          <a:chExt cx="0" cy="0"/>
+        </a:xfrm>
+      </p:grpSpPr>
+      <p:pic>
+        <p:nvPicPr>
+          <p:cNvPr id="7" name="Picture 6">
+            <a:extLst>
+              <a:ext uri="{FF2B5EF4-FFF2-40B4-BE49-F238E27FC236}">
+                <a16:creationId xmlns:a16="http://schemas.microsoft.com/office/drawing/2014/main" id="{D0E7446D-B25D-4CC3-B0BD-7351546968A0}"/>
+              </a:ext>
+            </a:extLst>
+          </p:cNvPr>
+          <p:cNvPicPr>
+            <a:picLocks noChangeAspect="1"/>
+          </p:cNvPicPr>
+          <p:nvPr/>
+        </p:nvPicPr>
+        <p:blipFill>
+          <a:blip r:embed="rId3"/>
+          <a:stretch>
+            <a:fillRect/>
+          </a:stretch>
+        </p:blipFill>
+        <p:spPr>
+          <a:xfrm>
+            <a:off x="2800350" y="217859"/>
+            <a:ext cx="6457936" cy="6422282"/>
+          </a:xfrm>
+          <a:prstGeom prst="rect">
+            <a:avLst/>
+          </a:prstGeom>
+        </p:spPr>
+      </p:pic>
+    </p:spTree>
+    <p:extLst>
+      <p:ext uri="{BB962C8B-B14F-4D97-AF65-F5344CB8AC3E}">
+        <p14:creationId xmlns:p14="http://schemas.microsoft.com/office/powerpoint/2010/main" val="3363355965"/>
+      </p:ext>
+    </p:extLst>
+  </p:cSld>
+  <p:clrMapOvr>
+    <a:masterClrMapping/>
+  </p:clrMapOvr>
+</p:sld>
+</file>
+
+<file path=ppt/slides/slide31.xml><?xml version="1.0" encoding="utf-8"?>
+<p:sld xmlns:a="http://schemas.openxmlformats.org/drawingml/2006/main" xmlns:r="http://schemas.openxmlformats.org/officeDocument/2006/relationships" xmlns:p="http://schemas.openxmlformats.org/presentationml/2006/main">
+  <p:cSld>
+    <p:spTree>
+      <p:nvGrpSpPr>
+        <p:cNvPr id="1" name=""/>
+        <p:cNvGrpSpPr/>
+        <p:nvPr/>
+      </p:nvGrpSpPr>
+      <p:grpSpPr>
+        <a:xfrm>
+          <a:off x="0" y="0"/>
+          <a:ext cx="0" cy="0"/>
+          <a:chOff x="0" y="0"/>
+          <a:chExt cx="0" cy="0"/>
+        </a:xfrm>
+      </p:grpSpPr>
+      <p:sp>
+        <p:nvSpPr>
+          <p:cNvPr id="2" name="Title 1">
+            <a:extLst>
+              <a:ext uri="{FF2B5EF4-FFF2-40B4-BE49-F238E27FC236}">
+                <a16:creationId xmlns:a16="http://schemas.microsoft.com/office/drawing/2014/main" id="{B1DE69EC-C59D-4688-95A0-A713D9F9FFF5}"/>
+              </a:ext>
+            </a:extLst>
+          </p:cNvPr>
+          <p:cNvSpPr>
+            <a:spLocks noGrp="1"/>
+          </p:cNvSpPr>
+          <p:nvPr>
+            <p:ph type="title"/>
+          </p:nvPr>
+        </p:nvSpPr>
+        <p:spPr/>
+        <p:txBody>
+          <a:bodyPr/>
+          <a:lstStyle/>
+          <a:p>
+            <a:r>
+              <a:rPr lang="en-US" dirty="0"/>
+              <a:t>When to use Redux</a:t>
+            </a:r>
+          </a:p>
+        </p:txBody>
+      </p:sp>
+      <p:sp>
+        <p:nvSpPr>
+          <p:cNvPr id="3" name="Content Placeholder 2">
+            <a:extLst>
+              <a:ext uri="{FF2B5EF4-FFF2-40B4-BE49-F238E27FC236}">
+                <a16:creationId xmlns:a16="http://schemas.microsoft.com/office/drawing/2014/main" id="{BD8F6A13-1666-457D-A85D-96076164CB70}"/>
+              </a:ext>
+            </a:extLst>
+          </p:cNvPr>
+          <p:cNvSpPr>
+            <a:spLocks noGrp="1"/>
+          </p:cNvSpPr>
+          <p:nvPr>
+            <p:ph idx="1"/>
+          </p:nvPr>
+        </p:nvSpPr>
+        <p:spPr/>
+        <p:txBody>
+          <a:bodyPr/>
+          <a:lstStyle/>
+          <a:p>
+            <a:pPr algn="l">
+              <a:buFont typeface="Arial" panose="020B0604020202020204" pitchFamily="34" charset="0"/>
+              <a:buChar char="•"/>
+            </a:pPr>
+            <a:r>
+              <a:rPr lang="en-US" b="0" i="0" dirty="0">
+                <a:solidFill>
+                  <a:srgbClr val="1C1E21"/>
+                </a:solidFill>
+                <a:effectLst/>
+                <a:latin typeface="system-ui"/>
+              </a:rPr>
+              <a:t>You have reasonable amounts of data changing over time</a:t>
+            </a:r>
+          </a:p>
+          <a:p>
+            <a:pPr algn="l">
+              <a:buFont typeface="Arial" panose="020B0604020202020204" pitchFamily="34" charset="0"/>
+              <a:buChar char="•"/>
+            </a:pPr>
+            <a:r>
+              <a:rPr lang="en-US" b="0" i="0" dirty="0">
+                <a:solidFill>
+                  <a:srgbClr val="1C1E21"/>
+                </a:solidFill>
+                <a:effectLst/>
+                <a:latin typeface="system-ui"/>
+              </a:rPr>
+              <a:t>You need a single source of truth for your state</a:t>
+            </a:r>
+          </a:p>
+          <a:p>
+            <a:pPr algn="l">
+              <a:buFont typeface="Arial" panose="020B0604020202020204" pitchFamily="34" charset="0"/>
+              <a:buChar char="•"/>
+            </a:pPr>
+            <a:r>
+              <a:rPr lang="en-US" b="0" i="0" dirty="0">
+                <a:solidFill>
+                  <a:srgbClr val="1C1E21"/>
+                </a:solidFill>
+                <a:effectLst/>
+                <a:latin typeface="system-ui"/>
+              </a:rPr>
+              <a:t>Keeping all your state in a top-level component is no longer sufficient.</a:t>
+            </a:r>
+          </a:p>
+          <a:p>
+            <a:pPr algn="l">
+              <a:buFont typeface="Arial" panose="020B0604020202020204" pitchFamily="34" charset="0"/>
+              <a:buChar char="•"/>
+            </a:pPr>
+            <a:endParaRPr lang="en-US" b="0" i="0" dirty="0">
+              <a:solidFill>
+                <a:srgbClr val="1C1E21"/>
+              </a:solidFill>
+              <a:effectLst/>
+              <a:latin typeface="system-ui"/>
+            </a:endParaRPr>
+          </a:p>
+          <a:p>
+            <a:pPr algn="l">
+              <a:buFont typeface="Arial" panose="020B0604020202020204" pitchFamily="34" charset="0"/>
+              <a:buChar char="•"/>
+            </a:pPr>
+            <a:r>
+              <a:rPr lang="en-US" b="1" i="0" dirty="0">
+                <a:solidFill>
+                  <a:srgbClr val="1C1E21"/>
+                </a:solidFill>
+                <a:effectLst/>
+                <a:latin typeface="system-ui"/>
+              </a:rPr>
+              <a:t>Global state that is needed across the app should go in the Redux store. </a:t>
+            </a:r>
+          </a:p>
+          <a:p>
+            <a:pPr lvl="1"/>
+            <a:r>
+              <a:rPr lang="en-US" i="0" dirty="0">
+                <a:solidFill>
+                  <a:srgbClr val="1C1E21"/>
+                </a:solidFill>
+                <a:effectLst/>
+                <a:latin typeface="system-ui"/>
+              </a:rPr>
+              <a:t>State only relevant to a single component can still be kept in component state.</a:t>
+            </a:r>
+          </a:p>
+          <a:p>
+            <a:endParaRPr lang="en-US" dirty="0"/>
+          </a:p>
+        </p:txBody>
+      </p:sp>
+    </p:spTree>
+    <p:extLst>
+      <p:ext uri="{BB962C8B-B14F-4D97-AF65-F5344CB8AC3E}">
+        <p14:creationId xmlns:p14="http://schemas.microsoft.com/office/powerpoint/2010/main" val="2503902979"/>
+      </p:ext>
+    </p:extLst>
+  </p:cSld>
+  <p:clrMapOvr>
+    <a:masterClrMapping/>
+  </p:clrMapOvr>
+</p:sld>
+</file>
+
+<file path=ppt/slides/slide32.xml><?xml version="1.0" encoding="utf-8"?>
 <p:sld xmlns:a="http://schemas.openxmlformats.org/drawingml/2006/main" xmlns:r="http://schemas.openxmlformats.org/officeDocument/2006/relationships" xmlns:p="http://schemas.openxmlformats.org/presentationml/2006/main">
   <p:cSld>
     <p:spTree>

</xml_diff>

<commit_message>
feat(Redux): Update to .pptx
</commit_message>
<xml_diff>
--- a/bootcamp/web/redux/presentation/redux.pptx
+++ b/bootcamp/web/redux/presentation/redux.pptx
@@ -7850,13 +7850,8 @@
           <a:p>
             <a:r>
               <a:rPr lang="en-US" dirty="0"/>
-              <a:t>Reference types </a:t>
-            </a:r>
-            <a:r>
-              <a:rPr lang="en-US"/>
-              <a:t>vs value types</a:t>
-            </a:r>
-            <a:endParaRPr lang="en-US" dirty="0"/>
+              <a:t>Reference types vs value types</a:t>
+            </a:r>
           </a:p>
         </p:txBody>
       </p:sp>
@@ -7952,16 +7947,44 @@
             </a:br>
             <a:r>
               <a:rPr lang="en-US" dirty="0"/>
-              <a:t>We have seen that Redux moved state to store, reducing the need for property passing. </a:t>
-            </a:r>
-          </a:p>
-          <a:p>
+              <a:t>We have seen that </a:t>
+            </a:r>
+          </a:p>
+          <a:p>
+            <a:pPr marL="171450" indent="-171450">
+              <a:buFont typeface="Arial" panose="020B0604020202020204" pitchFamily="34" charset="0"/>
+              <a:buChar char="•"/>
+            </a:pPr>
+            <a:r>
+              <a:rPr lang="en-US" dirty="0"/>
+              <a:t>Redux moved state to store, reducing the need for property passing. </a:t>
+            </a:r>
+          </a:p>
+          <a:p>
+            <a:pPr marL="171450" indent="-171450">
+              <a:buFont typeface="Arial" panose="020B0604020202020204" pitchFamily="34" charset="0"/>
+              <a:buChar char="•"/>
+            </a:pPr>
+            <a:r>
+              <a:rPr lang="en-US" dirty="0"/>
+              <a:t>Solve the issue with stale data in other components.</a:t>
+            </a:r>
+          </a:p>
+          <a:p>
+            <a:pPr marL="171450" indent="-171450">
+              <a:buFont typeface="Arial" panose="020B0604020202020204" pitchFamily="34" charset="0"/>
+              <a:buChar char="•"/>
+            </a:pPr>
             <a:r>
               <a:rPr lang="en-US" dirty="0"/>
               <a:t>It also made sure that all updates to a variable is at one place. </a:t>
             </a:r>
           </a:p>
           <a:p>
+            <a:pPr marL="171450" indent="-171450">
+              <a:buFont typeface="Arial" panose="020B0604020202020204" pitchFamily="34" charset="0"/>
+              <a:buChar char="•"/>
+            </a:pPr>
             <a:r>
               <a:rPr lang="en-US" dirty="0"/>
               <a:t>And all updates happens the same way. </a:t>
@@ -16013,7 +16036,7 @@
         </p:blipFill>
         <p:spPr>
           <a:xfrm>
-            <a:off x="3117918" y="1475741"/>
+            <a:off x="761529" y="1221741"/>
             <a:ext cx="5334471" cy="4940299"/>
           </a:xfrm>
           <a:prstGeom prst="rect">
@@ -16073,92 +16096,6 @@
   <p:clrMapOvr>
     <a:masterClrMapping/>
   </p:clrMapOvr>
-  <p:timing>
-    <p:tnLst>
-      <p:par>
-        <p:cTn id="1" dur="indefinite" restart="never" nodeType="tmRoot">
-          <p:childTnLst>
-            <p:seq concurrent="1" nextAc="seek">
-              <p:cTn id="2" dur="indefinite" nodeType="mainSeq">
-                <p:childTnLst>
-                  <p:par>
-                    <p:cTn id="3" fill="hold">
-                      <p:stCondLst>
-                        <p:cond delay="indefinite"/>
-                      </p:stCondLst>
-                      <p:childTnLst>
-                        <p:par>
-                          <p:cTn id="4" fill="hold">
-                            <p:stCondLst>
-                              <p:cond delay="0"/>
-                            </p:stCondLst>
-                            <p:childTnLst>
-                              <p:par>
-                                <p:cTn id="5" presetID="10" presetClass="exit" presetSubtype="0" fill="hold" grpId="0" nodeType="clickEffect">
-                                  <p:stCondLst>
-                                    <p:cond delay="0"/>
-                                  </p:stCondLst>
-                                  <p:childTnLst>
-                                    <p:animEffect transition="out" filter="fade">
-                                      <p:cBhvr>
-                                        <p:cTn id="6" dur="500"/>
-                                        <p:tgtEl>
-                                          <p:spTgt spid="11"/>
-                                        </p:tgtEl>
-                                      </p:cBhvr>
-                                    </p:animEffect>
-                                    <p:set>
-                                      <p:cBhvr>
-                                        <p:cTn id="7" dur="1" fill="hold">
-                                          <p:stCondLst>
-                                            <p:cond delay="499"/>
-                                          </p:stCondLst>
-                                        </p:cTn>
-                                        <p:tgtEl>
-                                          <p:spTgt spid="11"/>
-                                        </p:tgtEl>
-                                        <p:attrNameLst>
-                                          <p:attrName>style.visibility</p:attrName>
-                                        </p:attrNameLst>
-                                      </p:cBhvr>
-                                      <p:to>
-                                        <p:strVal val="hidden"/>
-                                      </p:to>
-                                    </p:set>
-                                  </p:childTnLst>
-                                </p:cTn>
-                              </p:par>
-                            </p:childTnLst>
-                          </p:cTn>
-                        </p:par>
-                      </p:childTnLst>
-                    </p:cTn>
-                  </p:par>
-                </p:childTnLst>
-              </p:cTn>
-              <p:prevCondLst>
-                <p:cond evt="onPrev" delay="0">
-                  <p:tgtEl>
-                    <p:sldTgt/>
-                  </p:tgtEl>
-                </p:cond>
-              </p:prevCondLst>
-              <p:nextCondLst>
-                <p:cond evt="onNext" delay="0">
-                  <p:tgtEl>
-                    <p:sldTgt/>
-                  </p:tgtEl>
-                </p:cond>
-              </p:nextCondLst>
-            </p:seq>
-          </p:childTnLst>
-        </p:cTn>
-      </p:par>
-    </p:tnLst>
-    <p:bldLst>
-      <p:bldP spid="11" grpId="0" animBg="1"/>
-    </p:bldLst>
-  </p:timing>
 </p:sld>
 </file>
 

</xml_diff>